<commit_message>
on to module 2
</commit_message>
<xml_diff>
--- a/Module_One/presentations/module_1_presentation.pptx
+++ b/Module_One/presentations/module_1_presentation.pptx
@@ -5,7 +5,7 @@
     <p:sldMasterId id="2147483655" r:id="rId1"/>
   </p:sldMasterIdLst>
   <p:notesMasterIdLst>
-    <p:notesMasterId r:id="rId47"/>
+    <p:notesMasterId r:id="rId53"/>
   </p:notesMasterIdLst>
   <p:sldIdLst>
     <p:sldId id="256" r:id="rId2"/>
@@ -52,7 +52,13 @@
     <p:sldId id="480" r:id="rId43"/>
     <p:sldId id="481" r:id="rId44"/>
     <p:sldId id="482" r:id="rId45"/>
-    <p:sldId id="483" r:id="rId46"/>
+    <p:sldId id="486" r:id="rId46"/>
+    <p:sldId id="487" r:id="rId47"/>
+    <p:sldId id="488" r:id="rId48"/>
+    <p:sldId id="489" r:id="rId49"/>
+    <p:sldId id="490" r:id="rId50"/>
+    <p:sldId id="492" r:id="rId51"/>
+    <p:sldId id="491" r:id="rId52"/>
   </p:sldIdLst>
   <p:sldSz cx="9144000" cy="6858000" type="screen4x3"/>
   <p:notesSz cx="6858000" cy="9144000"/>
@@ -7451,7 +7457,651 @@
     </p:spTree>
     <p:extLst>
       <p:ext uri="{BB962C8B-B14F-4D97-AF65-F5344CB8AC3E}">
-        <p14:creationId xmlns:p14="http://schemas.microsoft.com/office/powerpoint/2010/main" val="313233885"/>
+        <p14:creationId xmlns:p14="http://schemas.microsoft.com/office/powerpoint/2010/main" val="4106089099"/>
+      </p:ext>
+    </p:extLst>
+  </p:cSld>
+  <p:clrMapOvr>
+    <a:masterClrMapping/>
+  </p:clrMapOvr>
+</p:notes>
+</file>
+
+<file path=ppt/notesSlides/notesSlide46.xml><?xml version="1.0" encoding="utf-8"?>
+<p:notes xmlns:a="http://schemas.openxmlformats.org/drawingml/2006/main" xmlns:r="http://schemas.openxmlformats.org/officeDocument/2006/relationships" xmlns:p="http://schemas.openxmlformats.org/presentationml/2006/main" showMasterSp="0" showMasterPhAnim="0">
+  <p:cSld>
+    <p:spTree>
+      <p:nvGrpSpPr>
+        <p:cNvPr id="1" name="Shape 109"/>
+        <p:cNvGrpSpPr/>
+        <p:nvPr/>
+      </p:nvGrpSpPr>
+      <p:grpSpPr>
+        <a:xfrm>
+          <a:off x="0" y="0"/>
+          <a:ext cx="0" cy="0"/>
+          <a:chOff x="0" y="0"/>
+          <a:chExt cx="0" cy="0"/>
+        </a:xfrm>
+      </p:grpSpPr>
+      <p:sp>
+        <p:nvSpPr>
+          <p:cNvPr id="110" name="Shape 110"/>
+          <p:cNvSpPr>
+            <a:spLocks noGrp="1" noRot="1" noChangeAspect="1"/>
+          </p:cNvSpPr>
+          <p:nvPr>
+            <p:ph type="sldImg" idx="2"/>
+          </p:nvPr>
+        </p:nvSpPr>
+        <p:spPr>
+          <a:xfrm>
+            <a:off x="1143000" y="685800"/>
+            <a:ext cx="4572000" cy="3429000"/>
+          </a:xfrm>
+          <a:custGeom>
+            <a:avLst/>
+            <a:gdLst/>
+            <a:ahLst/>
+            <a:cxnLst/>
+            <a:rect l="0" t="0" r="0" b="0"/>
+            <a:pathLst>
+              <a:path w="120000" h="120000" extrusionOk="0">
+                <a:moveTo>
+                  <a:pt x="0" y="0"/>
+                </a:moveTo>
+                <a:lnTo>
+                  <a:pt x="120000" y="0"/>
+                </a:lnTo>
+                <a:lnTo>
+                  <a:pt x="120000" y="120000"/>
+                </a:lnTo>
+                <a:lnTo>
+                  <a:pt x="0" y="120000"/>
+                </a:lnTo>
+                <a:close/>
+              </a:path>
+            </a:pathLst>
+          </a:custGeom>
+        </p:spPr>
+      </p:sp>
+      <p:sp>
+        <p:nvSpPr>
+          <p:cNvPr id="111" name="Shape 111"/>
+          <p:cNvSpPr txBox="1">
+            <a:spLocks noGrp="1"/>
+          </p:cNvSpPr>
+          <p:nvPr>
+            <p:ph type="body" idx="1"/>
+          </p:nvPr>
+        </p:nvSpPr>
+        <p:spPr>
+          <a:xfrm>
+            <a:off x="685800" y="4343400"/>
+            <a:ext cx="5486399" cy="4114800"/>
+          </a:xfrm>
+          <a:prstGeom prst="rect">
+            <a:avLst/>
+          </a:prstGeom>
+        </p:spPr>
+        <p:txBody>
+          <a:bodyPr lIns="91425" tIns="91425" rIns="91425" bIns="91425" anchor="t" anchorCtr="0">
+            <a:noAutofit/>
+          </a:bodyPr>
+          <a:lstStyle/>
+          <a:p>
+            <a:pPr marL="0" marR="0" lvl="0" indent="0" algn="l" defTabSz="457200" rtl="0" eaLnBrk="1" fontAlgn="auto" latinLnBrk="0" hangingPunct="1">
+              <a:lnSpc>
+                <a:spcPct val="100000"/>
+              </a:lnSpc>
+              <a:spcBef>
+                <a:spcPts val="0"/>
+              </a:spcBef>
+              <a:spcAft>
+                <a:spcPts val="0"/>
+              </a:spcAft>
+              <a:buClrTx/>
+              <a:buSzTx/>
+              <a:buFontTx/>
+              <a:buNone/>
+              <a:tabLst/>
+              <a:defRPr/>
+            </a:pPr>
+            <a:endParaRPr dirty="0"/>
+          </a:p>
+        </p:txBody>
+      </p:sp>
+      <p:sp>
+        <p:nvSpPr>
+          <p:cNvPr id="112" name="Shape 112"/>
+          <p:cNvSpPr txBox="1">
+            <a:spLocks noGrp="1"/>
+          </p:cNvSpPr>
+          <p:nvPr>
+            <p:ph type="sldNum" idx="12"/>
+          </p:nvPr>
+        </p:nvSpPr>
+        <p:spPr>
+          <a:xfrm>
+            <a:off x="3884612" y="8685213"/>
+            <a:ext cx="2971799" cy="457200"/>
+          </a:xfrm>
+          <a:prstGeom prst="rect">
+            <a:avLst/>
+          </a:prstGeom>
+        </p:spPr>
+        <p:txBody>
+          <a:bodyPr lIns="91425" tIns="45700" rIns="91425" bIns="45700" anchor="b" anchorCtr="0">
+            <a:noAutofit/>
+          </a:bodyPr>
+          <a:lstStyle/>
+          <a:p>
+            <a:pPr lvl="0">
+              <a:spcBef>
+                <a:spcPts val="0"/>
+              </a:spcBef>
+              <a:buClr>
+                <a:srgbClr val="000000"/>
+              </a:buClr>
+              <a:buSzPct val="25000"/>
+              <a:buFont typeface="Arial"/>
+              <a:buNone/>
+            </a:pPr>
+            <a:fld id="{00000000-1234-1234-1234-123412341234}" type="slidenum">
+              <a:rPr lang="en-US"/>
+              <a:t>46</a:t>
+            </a:fld>
+            <a:endParaRPr lang="en-US"/>
+          </a:p>
+        </p:txBody>
+      </p:sp>
+    </p:spTree>
+    <p:extLst>
+      <p:ext uri="{BB962C8B-B14F-4D97-AF65-F5344CB8AC3E}">
+        <p14:creationId xmlns:p14="http://schemas.microsoft.com/office/powerpoint/2010/main" val="1540448073"/>
+      </p:ext>
+    </p:extLst>
+  </p:cSld>
+  <p:clrMapOvr>
+    <a:masterClrMapping/>
+  </p:clrMapOvr>
+</p:notes>
+</file>
+
+<file path=ppt/notesSlides/notesSlide47.xml><?xml version="1.0" encoding="utf-8"?>
+<p:notes xmlns:a="http://schemas.openxmlformats.org/drawingml/2006/main" xmlns:r="http://schemas.openxmlformats.org/officeDocument/2006/relationships" xmlns:p="http://schemas.openxmlformats.org/presentationml/2006/main" showMasterSp="0" showMasterPhAnim="0">
+  <p:cSld>
+    <p:spTree>
+      <p:nvGrpSpPr>
+        <p:cNvPr id="1" name="Shape 109"/>
+        <p:cNvGrpSpPr/>
+        <p:nvPr/>
+      </p:nvGrpSpPr>
+      <p:grpSpPr>
+        <a:xfrm>
+          <a:off x="0" y="0"/>
+          <a:ext cx="0" cy="0"/>
+          <a:chOff x="0" y="0"/>
+          <a:chExt cx="0" cy="0"/>
+        </a:xfrm>
+      </p:grpSpPr>
+      <p:sp>
+        <p:nvSpPr>
+          <p:cNvPr id="110" name="Shape 110"/>
+          <p:cNvSpPr>
+            <a:spLocks noGrp="1" noRot="1" noChangeAspect="1"/>
+          </p:cNvSpPr>
+          <p:nvPr>
+            <p:ph type="sldImg" idx="2"/>
+          </p:nvPr>
+        </p:nvSpPr>
+        <p:spPr>
+          <a:xfrm>
+            <a:off x="1143000" y="685800"/>
+            <a:ext cx="4572000" cy="3429000"/>
+          </a:xfrm>
+          <a:custGeom>
+            <a:avLst/>
+            <a:gdLst/>
+            <a:ahLst/>
+            <a:cxnLst/>
+            <a:rect l="0" t="0" r="0" b="0"/>
+            <a:pathLst>
+              <a:path w="120000" h="120000" extrusionOk="0">
+                <a:moveTo>
+                  <a:pt x="0" y="0"/>
+                </a:moveTo>
+                <a:lnTo>
+                  <a:pt x="120000" y="0"/>
+                </a:lnTo>
+                <a:lnTo>
+                  <a:pt x="120000" y="120000"/>
+                </a:lnTo>
+                <a:lnTo>
+                  <a:pt x="0" y="120000"/>
+                </a:lnTo>
+                <a:close/>
+              </a:path>
+            </a:pathLst>
+          </a:custGeom>
+        </p:spPr>
+      </p:sp>
+      <p:sp>
+        <p:nvSpPr>
+          <p:cNvPr id="111" name="Shape 111"/>
+          <p:cNvSpPr txBox="1">
+            <a:spLocks noGrp="1"/>
+          </p:cNvSpPr>
+          <p:nvPr>
+            <p:ph type="body" idx="1"/>
+          </p:nvPr>
+        </p:nvSpPr>
+        <p:spPr>
+          <a:xfrm>
+            <a:off x="685800" y="4343400"/>
+            <a:ext cx="5486399" cy="4114800"/>
+          </a:xfrm>
+          <a:prstGeom prst="rect">
+            <a:avLst/>
+          </a:prstGeom>
+        </p:spPr>
+        <p:txBody>
+          <a:bodyPr lIns="91425" tIns="91425" rIns="91425" bIns="91425" anchor="t" anchorCtr="0">
+            <a:noAutofit/>
+          </a:bodyPr>
+          <a:lstStyle/>
+          <a:p>
+            <a:pPr marL="0" marR="0" lvl="0" indent="0" algn="l" defTabSz="457200" rtl="0" eaLnBrk="1" fontAlgn="auto" latinLnBrk="0" hangingPunct="1">
+              <a:lnSpc>
+                <a:spcPct val="100000"/>
+              </a:lnSpc>
+              <a:spcBef>
+                <a:spcPts val="0"/>
+              </a:spcBef>
+              <a:spcAft>
+                <a:spcPts val="0"/>
+              </a:spcAft>
+              <a:buClrTx/>
+              <a:buSzTx/>
+              <a:buFontTx/>
+              <a:buNone/>
+              <a:tabLst/>
+              <a:defRPr/>
+            </a:pPr>
+            <a:endParaRPr dirty="0"/>
+          </a:p>
+        </p:txBody>
+      </p:sp>
+      <p:sp>
+        <p:nvSpPr>
+          <p:cNvPr id="112" name="Shape 112"/>
+          <p:cNvSpPr txBox="1">
+            <a:spLocks noGrp="1"/>
+          </p:cNvSpPr>
+          <p:nvPr>
+            <p:ph type="sldNum" idx="12"/>
+          </p:nvPr>
+        </p:nvSpPr>
+        <p:spPr>
+          <a:xfrm>
+            <a:off x="3884612" y="8685213"/>
+            <a:ext cx="2971799" cy="457200"/>
+          </a:xfrm>
+          <a:prstGeom prst="rect">
+            <a:avLst/>
+          </a:prstGeom>
+        </p:spPr>
+        <p:txBody>
+          <a:bodyPr lIns="91425" tIns="45700" rIns="91425" bIns="45700" anchor="b" anchorCtr="0">
+            <a:noAutofit/>
+          </a:bodyPr>
+          <a:lstStyle/>
+          <a:p>
+            <a:pPr lvl="0">
+              <a:spcBef>
+                <a:spcPts val="0"/>
+              </a:spcBef>
+              <a:buClr>
+                <a:srgbClr val="000000"/>
+              </a:buClr>
+              <a:buSzPct val="25000"/>
+              <a:buFont typeface="Arial"/>
+              <a:buNone/>
+            </a:pPr>
+            <a:fld id="{00000000-1234-1234-1234-123412341234}" type="slidenum">
+              <a:rPr lang="en-US"/>
+              <a:t>47</a:t>
+            </a:fld>
+            <a:endParaRPr lang="en-US"/>
+          </a:p>
+        </p:txBody>
+      </p:sp>
+    </p:spTree>
+    <p:extLst>
+      <p:ext uri="{BB962C8B-B14F-4D97-AF65-F5344CB8AC3E}">
+        <p14:creationId xmlns:p14="http://schemas.microsoft.com/office/powerpoint/2010/main" val="3315435160"/>
+      </p:ext>
+    </p:extLst>
+  </p:cSld>
+  <p:clrMapOvr>
+    <a:masterClrMapping/>
+  </p:clrMapOvr>
+</p:notes>
+</file>
+
+<file path=ppt/notesSlides/notesSlide48.xml><?xml version="1.0" encoding="utf-8"?>
+<p:notes xmlns:a="http://schemas.openxmlformats.org/drawingml/2006/main" xmlns:r="http://schemas.openxmlformats.org/officeDocument/2006/relationships" xmlns:p="http://schemas.openxmlformats.org/presentationml/2006/main" showMasterSp="0" showMasterPhAnim="0">
+  <p:cSld>
+    <p:spTree>
+      <p:nvGrpSpPr>
+        <p:cNvPr id="1" name="Shape 109"/>
+        <p:cNvGrpSpPr/>
+        <p:nvPr/>
+      </p:nvGrpSpPr>
+      <p:grpSpPr>
+        <a:xfrm>
+          <a:off x="0" y="0"/>
+          <a:ext cx="0" cy="0"/>
+          <a:chOff x="0" y="0"/>
+          <a:chExt cx="0" cy="0"/>
+        </a:xfrm>
+      </p:grpSpPr>
+      <p:sp>
+        <p:nvSpPr>
+          <p:cNvPr id="110" name="Shape 110"/>
+          <p:cNvSpPr>
+            <a:spLocks noGrp="1" noRot="1" noChangeAspect="1"/>
+          </p:cNvSpPr>
+          <p:nvPr>
+            <p:ph type="sldImg" idx="2"/>
+          </p:nvPr>
+        </p:nvSpPr>
+        <p:spPr>
+          <a:xfrm>
+            <a:off x="1143000" y="685800"/>
+            <a:ext cx="4572000" cy="3429000"/>
+          </a:xfrm>
+          <a:custGeom>
+            <a:avLst/>
+            <a:gdLst/>
+            <a:ahLst/>
+            <a:cxnLst/>
+            <a:rect l="0" t="0" r="0" b="0"/>
+            <a:pathLst>
+              <a:path w="120000" h="120000" extrusionOk="0">
+                <a:moveTo>
+                  <a:pt x="0" y="0"/>
+                </a:moveTo>
+                <a:lnTo>
+                  <a:pt x="120000" y="0"/>
+                </a:lnTo>
+                <a:lnTo>
+                  <a:pt x="120000" y="120000"/>
+                </a:lnTo>
+                <a:lnTo>
+                  <a:pt x="0" y="120000"/>
+                </a:lnTo>
+                <a:close/>
+              </a:path>
+            </a:pathLst>
+          </a:custGeom>
+        </p:spPr>
+      </p:sp>
+      <p:sp>
+        <p:nvSpPr>
+          <p:cNvPr id="111" name="Shape 111"/>
+          <p:cNvSpPr txBox="1">
+            <a:spLocks noGrp="1"/>
+          </p:cNvSpPr>
+          <p:nvPr>
+            <p:ph type="body" idx="1"/>
+          </p:nvPr>
+        </p:nvSpPr>
+        <p:spPr>
+          <a:xfrm>
+            <a:off x="685800" y="4343400"/>
+            <a:ext cx="5486399" cy="4114800"/>
+          </a:xfrm>
+          <a:prstGeom prst="rect">
+            <a:avLst/>
+          </a:prstGeom>
+        </p:spPr>
+        <p:txBody>
+          <a:bodyPr lIns="91425" tIns="91425" rIns="91425" bIns="91425" anchor="t" anchorCtr="0">
+            <a:noAutofit/>
+          </a:bodyPr>
+          <a:lstStyle/>
+          <a:p>
+            <a:pPr marL="0" marR="0" lvl="0" indent="0" algn="l" defTabSz="457200" rtl="0" eaLnBrk="1" fontAlgn="auto" latinLnBrk="0" hangingPunct="1">
+              <a:lnSpc>
+                <a:spcPct val="100000"/>
+              </a:lnSpc>
+              <a:spcBef>
+                <a:spcPts val="0"/>
+              </a:spcBef>
+              <a:spcAft>
+                <a:spcPts val="0"/>
+              </a:spcAft>
+              <a:buClrTx/>
+              <a:buSzTx/>
+              <a:buFontTx/>
+              <a:buNone/>
+              <a:tabLst/>
+              <a:defRPr/>
+            </a:pPr>
+            <a:endParaRPr dirty="0"/>
+          </a:p>
+        </p:txBody>
+      </p:sp>
+      <p:sp>
+        <p:nvSpPr>
+          <p:cNvPr id="112" name="Shape 112"/>
+          <p:cNvSpPr txBox="1">
+            <a:spLocks noGrp="1"/>
+          </p:cNvSpPr>
+          <p:nvPr>
+            <p:ph type="sldNum" idx="12"/>
+          </p:nvPr>
+        </p:nvSpPr>
+        <p:spPr>
+          <a:xfrm>
+            <a:off x="3884612" y="8685213"/>
+            <a:ext cx="2971799" cy="457200"/>
+          </a:xfrm>
+          <a:prstGeom prst="rect">
+            <a:avLst/>
+          </a:prstGeom>
+        </p:spPr>
+        <p:txBody>
+          <a:bodyPr lIns="91425" tIns="45700" rIns="91425" bIns="45700" anchor="b" anchorCtr="0">
+            <a:noAutofit/>
+          </a:bodyPr>
+          <a:lstStyle/>
+          <a:p>
+            <a:pPr lvl="0">
+              <a:spcBef>
+                <a:spcPts val="0"/>
+              </a:spcBef>
+              <a:buClr>
+                <a:srgbClr val="000000"/>
+              </a:buClr>
+              <a:buSzPct val="25000"/>
+              <a:buFont typeface="Arial"/>
+              <a:buNone/>
+            </a:pPr>
+            <a:fld id="{00000000-1234-1234-1234-123412341234}" type="slidenum">
+              <a:rPr lang="en-US"/>
+              <a:t>48</a:t>
+            </a:fld>
+            <a:endParaRPr lang="en-US"/>
+          </a:p>
+        </p:txBody>
+      </p:sp>
+    </p:spTree>
+    <p:extLst>
+      <p:ext uri="{BB962C8B-B14F-4D97-AF65-F5344CB8AC3E}">
+        <p14:creationId xmlns:p14="http://schemas.microsoft.com/office/powerpoint/2010/main" val="3037907996"/>
+      </p:ext>
+    </p:extLst>
+  </p:cSld>
+  <p:clrMapOvr>
+    <a:masterClrMapping/>
+  </p:clrMapOvr>
+</p:notes>
+</file>
+
+<file path=ppt/notesSlides/notesSlide49.xml><?xml version="1.0" encoding="utf-8"?>
+<p:notes xmlns:a="http://schemas.openxmlformats.org/drawingml/2006/main" xmlns:r="http://schemas.openxmlformats.org/officeDocument/2006/relationships" xmlns:p="http://schemas.openxmlformats.org/presentationml/2006/main" showMasterSp="0" showMasterPhAnim="0">
+  <p:cSld>
+    <p:spTree>
+      <p:nvGrpSpPr>
+        <p:cNvPr id="1" name="Shape 109"/>
+        <p:cNvGrpSpPr/>
+        <p:nvPr/>
+      </p:nvGrpSpPr>
+      <p:grpSpPr>
+        <a:xfrm>
+          <a:off x="0" y="0"/>
+          <a:ext cx="0" cy="0"/>
+          <a:chOff x="0" y="0"/>
+          <a:chExt cx="0" cy="0"/>
+        </a:xfrm>
+      </p:grpSpPr>
+      <p:sp>
+        <p:nvSpPr>
+          <p:cNvPr id="110" name="Shape 110"/>
+          <p:cNvSpPr>
+            <a:spLocks noGrp="1" noRot="1" noChangeAspect="1"/>
+          </p:cNvSpPr>
+          <p:nvPr>
+            <p:ph type="sldImg" idx="2"/>
+          </p:nvPr>
+        </p:nvSpPr>
+        <p:spPr>
+          <a:xfrm>
+            <a:off x="1143000" y="685800"/>
+            <a:ext cx="4572000" cy="3429000"/>
+          </a:xfrm>
+          <a:custGeom>
+            <a:avLst/>
+            <a:gdLst/>
+            <a:ahLst/>
+            <a:cxnLst/>
+            <a:rect l="0" t="0" r="0" b="0"/>
+            <a:pathLst>
+              <a:path w="120000" h="120000" extrusionOk="0">
+                <a:moveTo>
+                  <a:pt x="0" y="0"/>
+                </a:moveTo>
+                <a:lnTo>
+                  <a:pt x="120000" y="0"/>
+                </a:lnTo>
+                <a:lnTo>
+                  <a:pt x="120000" y="120000"/>
+                </a:lnTo>
+                <a:lnTo>
+                  <a:pt x="0" y="120000"/>
+                </a:lnTo>
+                <a:close/>
+              </a:path>
+            </a:pathLst>
+          </a:custGeom>
+        </p:spPr>
+      </p:sp>
+      <p:sp>
+        <p:nvSpPr>
+          <p:cNvPr id="111" name="Shape 111"/>
+          <p:cNvSpPr txBox="1">
+            <a:spLocks noGrp="1"/>
+          </p:cNvSpPr>
+          <p:nvPr>
+            <p:ph type="body" idx="1"/>
+          </p:nvPr>
+        </p:nvSpPr>
+        <p:spPr>
+          <a:xfrm>
+            <a:off x="685800" y="4343400"/>
+            <a:ext cx="5486399" cy="4114800"/>
+          </a:xfrm>
+          <a:prstGeom prst="rect">
+            <a:avLst/>
+          </a:prstGeom>
+        </p:spPr>
+        <p:txBody>
+          <a:bodyPr lIns="91425" tIns="91425" rIns="91425" bIns="91425" anchor="t" anchorCtr="0">
+            <a:noAutofit/>
+          </a:bodyPr>
+          <a:lstStyle/>
+          <a:p>
+            <a:pPr marL="0" marR="0" lvl="0" indent="0" algn="l" defTabSz="457200" rtl="0" eaLnBrk="1" fontAlgn="auto" latinLnBrk="0" hangingPunct="1">
+              <a:lnSpc>
+                <a:spcPct val="100000"/>
+              </a:lnSpc>
+              <a:spcBef>
+                <a:spcPts val="0"/>
+              </a:spcBef>
+              <a:spcAft>
+                <a:spcPts val="0"/>
+              </a:spcAft>
+              <a:buClrTx/>
+              <a:buSzTx/>
+              <a:buFontTx/>
+              <a:buNone/>
+              <a:tabLst/>
+              <a:defRPr/>
+            </a:pPr>
+            <a:endParaRPr dirty="0"/>
+          </a:p>
+        </p:txBody>
+      </p:sp>
+      <p:sp>
+        <p:nvSpPr>
+          <p:cNvPr id="112" name="Shape 112"/>
+          <p:cNvSpPr txBox="1">
+            <a:spLocks noGrp="1"/>
+          </p:cNvSpPr>
+          <p:nvPr>
+            <p:ph type="sldNum" idx="12"/>
+          </p:nvPr>
+        </p:nvSpPr>
+        <p:spPr>
+          <a:xfrm>
+            <a:off x="3884612" y="8685213"/>
+            <a:ext cx="2971799" cy="457200"/>
+          </a:xfrm>
+          <a:prstGeom prst="rect">
+            <a:avLst/>
+          </a:prstGeom>
+        </p:spPr>
+        <p:txBody>
+          <a:bodyPr lIns="91425" tIns="45700" rIns="91425" bIns="45700" anchor="b" anchorCtr="0">
+            <a:noAutofit/>
+          </a:bodyPr>
+          <a:lstStyle/>
+          <a:p>
+            <a:pPr lvl="0">
+              <a:spcBef>
+                <a:spcPts val="0"/>
+              </a:spcBef>
+              <a:buClr>
+                <a:srgbClr val="000000"/>
+              </a:buClr>
+              <a:buSzPct val="25000"/>
+              <a:buFont typeface="Arial"/>
+              <a:buNone/>
+            </a:pPr>
+            <a:fld id="{00000000-1234-1234-1234-123412341234}" type="slidenum">
+              <a:rPr lang="en-US"/>
+              <a:t>49</a:t>
+            </a:fld>
+            <a:endParaRPr lang="en-US"/>
+          </a:p>
+        </p:txBody>
+      </p:sp>
+    </p:spTree>
+    <p:extLst>
+      <p:ext uri="{BB962C8B-B14F-4D97-AF65-F5344CB8AC3E}">
+        <p14:creationId xmlns:p14="http://schemas.microsoft.com/office/powerpoint/2010/main" val="2989984629"/>
       </p:ext>
     </p:extLst>
   </p:cSld>
@@ -7555,6 +8205,328 @@
         </p:spPr>
       </p:sp>
     </p:spTree>
+  </p:cSld>
+  <p:clrMapOvr>
+    <a:masterClrMapping/>
+  </p:clrMapOvr>
+</p:notes>
+</file>
+
+<file path=ppt/notesSlides/notesSlide50.xml><?xml version="1.0" encoding="utf-8"?>
+<p:notes xmlns:a="http://schemas.openxmlformats.org/drawingml/2006/main" xmlns:r="http://schemas.openxmlformats.org/officeDocument/2006/relationships" xmlns:p="http://schemas.openxmlformats.org/presentationml/2006/main" showMasterSp="0" showMasterPhAnim="0">
+  <p:cSld>
+    <p:spTree>
+      <p:nvGrpSpPr>
+        <p:cNvPr id="1" name="Shape 109"/>
+        <p:cNvGrpSpPr/>
+        <p:nvPr/>
+      </p:nvGrpSpPr>
+      <p:grpSpPr>
+        <a:xfrm>
+          <a:off x="0" y="0"/>
+          <a:ext cx="0" cy="0"/>
+          <a:chOff x="0" y="0"/>
+          <a:chExt cx="0" cy="0"/>
+        </a:xfrm>
+      </p:grpSpPr>
+      <p:sp>
+        <p:nvSpPr>
+          <p:cNvPr id="110" name="Shape 110"/>
+          <p:cNvSpPr>
+            <a:spLocks noGrp="1" noRot="1" noChangeAspect="1"/>
+          </p:cNvSpPr>
+          <p:nvPr>
+            <p:ph type="sldImg" idx="2"/>
+          </p:nvPr>
+        </p:nvSpPr>
+        <p:spPr>
+          <a:xfrm>
+            <a:off x="1143000" y="685800"/>
+            <a:ext cx="4572000" cy="3429000"/>
+          </a:xfrm>
+          <a:custGeom>
+            <a:avLst/>
+            <a:gdLst/>
+            <a:ahLst/>
+            <a:cxnLst/>
+            <a:rect l="0" t="0" r="0" b="0"/>
+            <a:pathLst>
+              <a:path w="120000" h="120000" extrusionOk="0">
+                <a:moveTo>
+                  <a:pt x="0" y="0"/>
+                </a:moveTo>
+                <a:lnTo>
+                  <a:pt x="120000" y="0"/>
+                </a:lnTo>
+                <a:lnTo>
+                  <a:pt x="120000" y="120000"/>
+                </a:lnTo>
+                <a:lnTo>
+                  <a:pt x="0" y="120000"/>
+                </a:lnTo>
+                <a:close/>
+              </a:path>
+            </a:pathLst>
+          </a:custGeom>
+        </p:spPr>
+      </p:sp>
+      <p:sp>
+        <p:nvSpPr>
+          <p:cNvPr id="111" name="Shape 111"/>
+          <p:cNvSpPr txBox="1">
+            <a:spLocks noGrp="1"/>
+          </p:cNvSpPr>
+          <p:nvPr>
+            <p:ph type="body" idx="1"/>
+          </p:nvPr>
+        </p:nvSpPr>
+        <p:spPr>
+          <a:xfrm>
+            <a:off x="685800" y="4343400"/>
+            <a:ext cx="5486399" cy="4114800"/>
+          </a:xfrm>
+          <a:prstGeom prst="rect">
+            <a:avLst/>
+          </a:prstGeom>
+        </p:spPr>
+        <p:txBody>
+          <a:bodyPr lIns="91425" tIns="91425" rIns="91425" bIns="91425" anchor="t" anchorCtr="0">
+            <a:noAutofit/>
+          </a:bodyPr>
+          <a:lstStyle/>
+          <a:p>
+            <a:pPr marL="0" marR="0" lvl="0" indent="0" algn="l" defTabSz="457200" rtl="0" eaLnBrk="1" fontAlgn="auto" latinLnBrk="0" hangingPunct="1">
+              <a:lnSpc>
+                <a:spcPct val="100000"/>
+              </a:lnSpc>
+              <a:spcBef>
+                <a:spcPts val="0"/>
+              </a:spcBef>
+              <a:spcAft>
+                <a:spcPts val="0"/>
+              </a:spcAft>
+              <a:buClrTx/>
+              <a:buSzTx/>
+              <a:buFontTx/>
+              <a:buNone/>
+              <a:tabLst/>
+              <a:defRPr/>
+            </a:pPr>
+            <a:endParaRPr dirty="0"/>
+          </a:p>
+        </p:txBody>
+      </p:sp>
+      <p:sp>
+        <p:nvSpPr>
+          <p:cNvPr id="112" name="Shape 112"/>
+          <p:cNvSpPr txBox="1">
+            <a:spLocks noGrp="1"/>
+          </p:cNvSpPr>
+          <p:nvPr>
+            <p:ph type="sldNum" idx="12"/>
+          </p:nvPr>
+        </p:nvSpPr>
+        <p:spPr>
+          <a:xfrm>
+            <a:off x="3884612" y="8685213"/>
+            <a:ext cx="2971799" cy="457200"/>
+          </a:xfrm>
+          <a:prstGeom prst="rect">
+            <a:avLst/>
+          </a:prstGeom>
+        </p:spPr>
+        <p:txBody>
+          <a:bodyPr lIns="91425" tIns="45700" rIns="91425" bIns="45700" anchor="b" anchorCtr="0">
+            <a:noAutofit/>
+          </a:bodyPr>
+          <a:lstStyle/>
+          <a:p>
+            <a:pPr lvl="0">
+              <a:spcBef>
+                <a:spcPts val="0"/>
+              </a:spcBef>
+              <a:buClr>
+                <a:srgbClr val="000000"/>
+              </a:buClr>
+              <a:buSzPct val="25000"/>
+              <a:buFont typeface="Arial"/>
+              <a:buNone/>
+            </a:pPr>
+            <a:fld id="{00000000-1234-1234-1234-123412341234}" type="slidenum">
+              <a:rPr lang="en-US"/>
+              <a:t>50</a:t>
+            </a:fld>
+            <a:endParaRPr lang="en-US"/>
+          </a:p>
+        </p:txBody>
+      </p:sp>
+    </p:spTree>
+    <p:extLst>
+      <p:ext uri="{BB962C8B-B14F-4D97-AF65-F5344CB8AC3E}">
+        <p14:creationId xmlns:p14="http://schemas.microsoft.com/office/powerpoint/2010/main" val="109236561"/>
+      </p:ext>
+    </p:extLst>
+  </p:cSld>
+  <p:clrMapOvr>
+    <a:masterClrMapping/>
+  </p:clrMapOvr>
+</p:notes>
+</file>
+
+<file path=ppt/notesSlides/notesSlide51.xml><?xml version="1.0" encoding="utf-8"?>
+<p:notes xmlns:a="http://schemas.openxmlformats.org/drawingml/2006/main" xmlns:r="http://schemas.openxmlformats.org/officeDocument/2006/relationships" xmlns:p="http://schemas.openxmlformats.org/presentationml/2006/main" showMasterSp="0" showMasterPhAnim="0">
+  <p:cSld>
+    <p:spTree>
+      <p:nvGrpSpPr>
+        <p:cNvPr id="1" name="Shape 109"/>
+        <p:cNvGrpSpPr/>
+        <p:nvPr/>
+      </p:nvGrpSpPr>
+      <p:grpSpPr>
+        <a:xfrm>
+          <a:off x="0" y="0"/>
+          <a:ext cx="0" cy="0"/>
+          <a:chOff x="0" y="0"/>
+          <a:chExt cx="0" cy="0"/>
+        </a:xfrm>
+      </p:grpSpPr>
+      <p:sp>
+        <p:nvSpPr>
+          <p:cNvPr id="110" name="Shape 110"/>
+          <p:cNvSpPr>
+            <a:spLocks noGrp="1" noRot="1" noChangeAspect="1"/>
+          </p:cNvSpPr>
+          <p:nvPr>
+            <p:ph type="sldImg" idx="2"/>
+          </p:nvPr>
+        </p:nvSpPr>
+        <p:spPr>
+          <a:xfrm>
+            <a:off x="1143000" y="685800"/>
+            <a:ext cx="4572000" cy="3429000"/>
+          </a:xfrm>
+          <a:custGeom>
+            <a:avLst/>
+            <a:gdLst/>
+            <a:ahLst/>
+            <a:cxnLst/>
+            <a:rect l="0" t="0" r="0" b="0"/>
+            <a:pathLst>
+              <a:path w="120000" h="120000" extrusionOk="0">
+                <a:moveTo>
+                  <a:pt x="0" y="0"/>
+                </a:moveTo>
+                <a:lnTo>
+                  <a:pt x="120000" y="0"/>
+                </a:lnTo>
+                <a:lnTo>
+                  <a:pt x="120000" y="120000"/>
+                </a:lnTo>
+                <a:lnTo>
+                  <a:pt x="0" y="120000"/>
+                </a:lnTo>
+                <a:close/>
+              </a:path>
+            </a:pathLst>
+          </a:custGeom>
+        </p:spPr>
+      </p:sp>
+      <p:sp>
+        <p:nvSpPr>
+          <p:cNvPr id="111" name="Shape 111"/>
+          <p:cNvSpPr txBox="1">
+            <a:spLocks noGrp="1"/>
+          </p:cNvSpPr>
+          <p:nvPr>
+            <p:ph type="body" idx="1"/>
+          </p:nvPr>
+        </p:nvSpPr>
+        <p:spPr>
+          <a:xfrm>
+            <a:off x="685800" y="4343400"/>
+            <a:ext cx="5486399" cy="4114800"/>
+          </a:xfrm>
+          <a:prstGeom prst="rect">
+            <a:avLst/>
+          </a:prstGeom>
+        </p:spPr>
+        <p:txBody>
+          <a:bodyPr lIns="91425" tIns="91425" rIns="91425" bIns="91425" anchor="t" anchorCtr="0">
+            <a:noAutofit/>
+          </a:bodyPr>
+          <a:lstStyle/>
+          <a:p>
+            <a:pPr marL="0" marR="0" lvl="0" indent="0" algn="l" defTabSz="457200" rtl="0" eaLnBrk="1" fontAlgn="auto" latinLnBrk="0" hangingPunct="1">
+              <a:lnSpc>
+                <a:spcPct val="100000"/>
+              </a:lnSpc>
+              <a:spcBef>
+                <a:spcPts val="0"/>
+              </a:spcBef>
+              <a:spcAft>
+                <a:spcPts val="0"/>
+              </a:spcAft>
+              <a:buClrTx/>
+              <a:buSzTx/>
+              <a:buFontTx/>
+              <a:buNone/>
+              <a:tabLst/>
+              <a:defRPr/>
+            </a:pPr>
+            <a:endParaRPr dirty="0"/>
+          </a:p>
+        </p:txBody>
+      </p:sp>
+      <p:sp>
+        <p:nvSpPr>
+          <p:cNvPr id="112" name="Shape 112"/>
+          <p:cNvSpPr txBox="1">
+            <a:spLocks noGrp="1"/>
+          </p:cNvSpPr>
+          <p:nvPr>
+            <p:ph type="sldNum" idx="12"/>
+          </p:nvPr>
+        </p:nvSpPr>
+        <p:spPr>
+          <a:xfrm>
+            <a:off x="3884612" y="8685213"/>
+            <a:ext cx="2971799" cy="457200"/>
+          </a:xfrm>
+          <a:prstGeom prst="rect">
+            <a:avLst/>
+          </a:prstGeom>
+        </p:spPr>
+        <p:txBody>
+          <a:bodyPr lIns="91425" tIns="45700" rIns="91425" bIns="45700" anchor="b" anchorCtr="0">
+            <a:noAutofit/>
+          </a:bodyPr>
+          <a:lstStyle/>
+          <a:p>
+            <a:pPr lvl="0">
+              <a:spcBef>
+                <a:spcPts val="0"/>
+              </a:spcBef>
+              <a:buClr>
+                <a:srgbClr val="000000"/>
+              </a:buClr>
+              <a:buSzPct val="25000"/>
+              <a:buFont typeface="Arial"/>
+              <a:buNone/>
+            </a:pPr>
+            <a:fld id="{00000000-1234-1234-1234-123412341234}" type="slidenum">
+              <a:rPr lang="en-US"/>
+              <a:t>51</a:t>
+            </a:fld>
+            <a:endParaRPr lang="en-US"/>
+          </a:p>
+        </p:txBody>
+      </p:sp>
+    </p:spTree>
+    <p:extLst>
+      <p:ext uri="{BB962C8B-B14F-4D97-AF65-F5344CB8AC3E}">
+        <p14:creationId xmlns:p14="http://schemas.microsoft.com/office/powerpoint/2010/main" val="1224623731"/>
+      </p:ext>
+    </p:extLst>
   </p:cSld>
   <p:clrMapOvr>
     <a:masterClrMapping/>
@@ -25406,10 +26378,10 @@
               <a:buNone/>
             </a:pPr>
             <a:r>
-              <a:rPr lang="en-US" sz="3600" dirty="0"/>
-              <a:t>Golang Setup (command line commands)</a:t>
-            </a:r>
-            <a:endParaRPr sz="3600" dirty="0"/>
+              <a:rPr lang="en-US" dirty="0"/>
+              <a:t>Golang Playground</a:t>
+            </a:r>
+            <a:endParaRPr dirty="0"/>
           </a:p>
         </p:txBody>
       </p:sp>
@@ -25450,7 +26422,7 @@
                 </a:solidFill>
                 <a:latin typeface="+mn-lt"/>
               </a:rPr>
-              <a:t>Now that we’re set up let’s go over some of the command line commands with go. Let’s go over the most important ones to start with: </a:t>
+              <a:t> So now that we have created our directory structure let’s put it aside for a moment. Why? </a:t>
             </a:r>
           </a:p>
           <a:p>
@@ -25460,21 +26432,48 @@
               </a:spcBef>
             </a:pPr>
             <a:r>
+              <a:rPr lang="en-US" dirty="0">
+                <a:solidFill>
+                  <a:schemeClr val="tx1"/>
+                </a:solidFill>
+                <a:latin typeface="+mn-lt"/>
+              </a:rPr>
+              <a:t>Well- as many of you probably realize- coding is painful without some sort of CLI (Command Line Interface) to work with.</a:t>
+            </a:r>
+          </a:p>
+          <a:p>
+            <a:pPr lvl="3">
+              <a:spcBef>
+                <a:spcPts val="0"/>
+              </a:spcBef>
+            </a:pPr>
+            <a:r>
+              <a:rPr lang="en-US" dirty="0">
+                <a:solidFill>
+                  <a:schemeClr val="tx1"/>
+                </a:solidFill>
+                <a:latin typeface="+mn-lt"/>
+              </a:rPr>
+              <a:t>In Python we have great programs like typing “python” into your command line (or </a:t>
+            </a:r>
+            <a:r>
               <a:rPr lang="en-US" b="1" dirty="0">
                 <a:solidFill>
                   <a:schemeClr val="tx1"/>
                 </a:solidFill>
                 <a:latin typeface="+mn-lt"/>
               </a:rPr>
-              <a:t>go get</a:t>
-            </a:r>
-          </a:p>
-          <a:p>
-            <a:pPr lvl="4">
-              <a:spcBef>
-                <a:spcPts val="0"/>
-              </a:spcBef>
-            </a:pPr>
+              <a:t>pip install </a:t>
+            </a:r>
+            <a:r>
+              <a:rPr lang="en-US" b="1" dirty="0" err="1">
+                <a:solidFill>
+                  <a:schemeClr val="tx1"/>
+                </a:solidFill>
+                <a:latin typeface="+mn-lt"/>
+              </a:rPr>
+              <a:t>ipython</a:t>
+            </a:r>
             <a:r>
               <a:rPr lang="en-US" dirty="0">
                 <a:solidFill>
@@ -25482,7 +26481,7 @@
                 </a:solidFill>
                 <a:latin typeface="+mn-lt"/>
               </a:rPr>
-              <a:t>This is the package manager- basically the equivalent of </a:t>
+              <a:t> and then typing </a:t>
             </a:r>
             <a:r>
               <a:rPr lang="en-US" b="1" dirty="0">
@@ -25491,7 +26490,16 @@
                 </a:solidFill>
                 <a:latin typeface="+mn-lt"/>
               </a:rPr>
-              <a:t>pip install </a:t>
+              <a:t>“</a:t>
+            </a:r>
+            <a:r>
+              <a:rPr lang="en-US" b="1" dirty="0" err="1">
+                <a:solidFill>
+                  <a:schemeClr val="tx1"/>
+                </a:solidFill>
+                <a:latin typeface="+mn-lt"/>
+              </a:rPr>
+              <a:t>ipython</a:t>
             </a:r>
             <a:r>
               <a:rPr lang="en-US" dirty="0">
@@ -25500,16 +26508,23 @@
                 </a:solidFill>
                 <a:latin typeface="+mn-lt"/>
               </a:rPr>
-              <a:t>or </a:t>
-            </a:r>
-            <a:r>
-              <a:rPr lang="en-US" b="1" dirty="0" err="1">
+              <a:t>” into your CLI).</a:t>
+            </a:r>
+          </a:p>
+          <a:p>
+            <a:pPr lvl="3">
+              <a:spcBef>
+                <a:spcPts val="0"/>
+              </a:spcBef>
+            </a:pPr>
+            <a:r>
+              <a:rPr lang="en-US" dirty="0">
                 <a:solidFill>
                   <a:schemeClr val="tx1"/>
                 </a:solidFill>
                 <a:latin typeface="+mn-lt"/>
               </a:rPr>
-              <a:t>npm</a:t>
+              <a:t>In Node.js we have great programs like </a:t>
             </a:r>
             <a:r>
               <a:rPr lang="en-US" b="1" dirty="0">
@@ -25518,7 +26533,7 @@
                 </a:solidFill>
                 <a:latin typeface="+mn-lt"/>
               </a:rPr>
-              <a:t> install.</a:t>
+              <a:t>node</a:t>
             </a:r>
             <a:r>
               <a:rPr lang="en-US" dirty="0">
@@ -25527,15 +26542,17 @@
                 </a:solidFill>
                 <a:latin typeface="+mn-lt"/>
               </a:rPr>
-              <a:t> Let’s “go get” a package.</a:t>
-            </a:r>
-          </a:p>
-          <a:p>
-            <a:pPr lvl="4">
-              <a:spcBef>
-                <a:spcPts val="0"/>
-              </a:spcBef>
-            </a:pPr>
+              <a:t> or </a:t>
+            </a:r>
+            <a:r>
+              <a:rPr lang="en-US" b="1" dirty="0">
+                <a:solidFill>
+                  <a:schemeClr val="tx1"/>
+                </a:solidFill>
+                <a:latin typeface="+mn-lt"/>
+              </a:rPr>
+              <a:t>nesh</a:t>
+            </a:r>
             <a:r>
               <a:rPr lang="en-US" dirty="0">
                 <a:solidFill>
@@ -25543,118 +26560,24 @@
                 </a:solidFill>
                 <a:latin typeface="+mn-lt"/>
               </a:rPr>
-              <a:t> Note that “go get” is using your $GOPATH to place the file in it’s correct location (notice how the “</a:t>
-            </a:r>
-            <a:r>
-              <a:rPr lang="en-US" dirty="0" err="1">
+              <a:t> which give us awesome command line interfaces to test our code before we push it. </a:t>
+            </a:r>
+          </a:p>
+          <a:p>
+            <a:pPr lvl="3">
+              <a:spcBef>
+                <a:spcPts val="0"/>
+              </a:spcBef>
+            </a:pPr>
+            <a:r>
+              <a:rPr lang="en-US" dirty="0">
                 <a:solidFill>
                   <a:schemeClr val="tx1"/>
                 </a:solidFill>
                 <a:latin typeface="+mn-lt"/>
               </a:rPr>
-              <a:t>src</a:t>
-            </a:r>
-            <a:r>
-              <a:rPr lang="en-US" dirty="0">
-                <a:solidFill>
-                  <a:schemeClr val="tx1"/>
-                </a:solidFill>
-                <a:latin typeface="+mn-lt"/>
-              </a:rPr>
-              <a:t>/</a:t>
-            </a:r>
-            <a:r>
-              <a:rPr lang="en-US" dirty="0" err="1">
-                <a:solidFill>
-                  <a:schemeClr val="tx1"/>
-                </a:solidFill>
-                <a:latin typeface="+mn-lt"/>
-              </a:rPr>
-              <a:t>github.com</a:t>
-            </a:r>
-            <a:r>
-              <a:rPr lang="en-US" dirty="0">
-                <a:solidFill>
-                  <a:schemeClr val="tx1"/>
-                </a:solidFill>
-                <a:latin typeface="+mn-lt"/>
-              </a:rPr>
-              <a:t>/” lined up?)</a:t>
-            </a:r>
-          </a:p>
-          <a:p>
-            <a:pPr lvl="4">
-              <a:spcBef>
-                <a:spcPts val="0"/>
-              </a:spcBef>
-            </a:pPr>
-            <a:r>
-              <a:rPr lang="en-US" dirty="0">
-                <a:solidFill>
-                  <a:schemeClr val="tx1"/>
-                </a:solidFill>
-                <a:latin typeface="+mn-lt"/>
-              </a:rPr>
-              <a:t> Now let’s try importing it! To do that we need to create a “</a:t>
-            </a:r>
-            <a:r>
-              <a:rPr lang="en-US" dirty="0" err="1">
-                <a:solidFill>
-                  <a:schemeClr val="tx1"/>
-                </a:solidFill>
-                <a:latin typeface="+mn-lt"/>
-              </a:rPr>
-              <a:t>main.go</a:t>
-            </a:r>
-            <a:r>
-              <a:rPr lang="en-US" dirty="0">
-                <a:solidFill>
-                  <a:schemeClr val="tx1"/>
-                </a:solidFill>
-                <a:latin typeface="+mn-lt"/>
-              </a:rPr>
-              <a:t>” file somewhere. </a:t>
-            </a:r>
-          </a:p>
-          <a:p>
-            <a:pPr lvl="4">
-              <a:spcBef>
-                <a:spcPts val="0"/>
-              </a:spcBef>
-            </a:pPr>
-            <a:r>
-              <a:rPr lang="en-US" b="1" dirty="0">
-                <a:solidFill>
-                  <a:schemeClr val="tx1"/>
-                </a:solidFill>
-                <a:latin typeface="+mn-lt"/>
-              </a:rPr>
-              <a:t>WHERE should we put that </a:t>
-            </a:r>
-            <a:r>
-              <a:rPr lang="en-US" b="1" dirty="0" err="1">
-                <a:solidFill>
-                  <a:schemeClr val="tx1"/>
-                </a:solidFill>
-                <a:latin typeface="+mn-lt"/>
-              </a:rPr>
-              <a:t>main.go</a:t>
-            </a:r>
-            <a:r>
-              <a:rPr lang="en-US" b="1">
-                <a:solidFill>
-                  <a:schemeClr val="tx1"/>
-                </a:solidFill>
-                <a:latin typeface="+mn-lt"/>
-              </a:rPr>
-              <a:t> file??</a:t>
-            </a:r>
-            <a:endParaRPr lang="en-US" b="1" dirty="0">
-              <a:solidFill>
-                <a:schemeClr val="tx1"/>
-              </a:solidFill>
-              <a:latin typeface="+mn-lt"/>
-            </a:endParaRPr>
+              <a:t>So how do we do this in GOLANG?</a:t>
+            </a:r>
           </a:p>
           <a:p>
             <a:pPr lvl="3">
@@ -25766,10 +26689,1597 @@
           </a:p>
         </p:txBody>
       </p:sp>
+      <p:pic>
+        <p:nvPicPr>
+          <p:cNvPr id="11266" name="Picture 2" descr="Image result for golang gopher images">
+            <a:extLst>
+              <a:ext uri="{FF2B5EF4-FFF2-40B4-BE49-F238E27FC236}">
+                <a16:creationId xmlns:a16="http://schemas.microsoft.com/office/drawing/2014/main" id="{4AFA6BD1-8029-1C47-9CCC-0CEDF6774B26}"/>
+              </a:ext>
+            </a:extLst>
+          </p:cNvPr>
+          <p:cNvPicPr>
+            <a:picLocks noChangeAspect="1" noChangeArrowheads="1"/>
+          </p:cNvPicPr>
+          <p:nvPr/>
+        </p:nvPicPr>
+        <p:blipFill>
+          <a:blip r:embed="rId3">
+            <a:extLst>
+              <a:ext uri="{28A0092B-C50C-407E-A947-70E740481C1C}">
+                <a14:useLocalDpi xmlns:a14="http://schemas.microsoft.com/office/drawing/2010/main" val="0"/>
+              </a:ext>
+            </a:extLst>
+          </a:blip>
+          <a:srcRect/>
+          <a:stretch>
+            <a:fillRect/>
+          </a:stretch>
+        </p:blipFill>
+        <p:spPr bwMode="auto">
+          <a:xfrm>
+            <a:off x="3449451" y="4325419"/>
+            <a:ext cx="1571188" cy="2144017"/>
+          </a:xfrm>
+          <a:prstGeom prst="rect">
+            <a:avLst/>
+          </a:prstGeom>
+          <a:noFill/>
+          <a:extLst>
+            <a:ext uri="{909E8E84-426E-40DD-AFC4-6F175D3DCCD1}">
+              <a14:hiddenFill xmlns:a14="http://schemas.microsoft.com/office/drawing/2010/main">
+                <a:solidFill>
+                  <a:srgbClr val="FFFFFF"/>
+                </a:solidFill>
+              </a14:hiddenFill>
+            </a:ext>
+          </a:extLst>
+        </p:spPr>
+      </p:pic>
     </p:spTree>
     <p:extLst>
       <p:ext uri="{BB962C8B-B14F-4D97-AF65-F5344CB8AC3E}">
-        <p14:creationId xmlns:p14="http://schemas.microsoft.com/office/powerpoint/2010/main" val="3415736018"/>
+        <p14:creationId xmlns:p14="http://schemas.microsoft.com/office/powerpoint/2010/main" val="3946465070"/>
+      </p:ext>
+    </p:extLst>
+  </p:cSld>
+  <p:clrMapOvr>
+    <a:masterClrMapping/>
+  </p:clrMapOvr>
+</p:sld>
+</file>
+
+<file path=ppt/slides/slide46.xml><?xml version="1.0" encoding="utf-8"?>
+<p:sld xmlns:a="http://schemas.openxmlformats.org/drawingml/2006/main" xmlns:r="http://schemas.openxmlformats.org/officeDocument/2006/relationships" xmlns:p="http://schemas.openxmlformats.org/presentationml/2006/main">
+  <p:cSld>
+    <p:spTree>
+      <p:nvGrpSpPr>
+        <p:cNvPr id="1" name="Shape 113"/>
+        <p:cNvGrpSpPr/>
+        <p:nvPr/>
+      </p:nvGrpSpPr>
+      <p:grpSpPr>
+        <a:xfrm>
+          <a:off x="0" y="0"/>
+          <a:ext cx="0" cy="0"/>
+          <a:chOff x="0" y="0"/>
+          <a:chExt cx="0" cy="0"/>
+        </a:xfrm>
+      </p:grpSpPr>
+      <p:sp>
+        <p:nvSpPr>
+          <p:cNvPr id="114" name="Shape 114"/>
+          <p:cNvSpPr txBox="1">
+            <a:spLocks noGrp="1"/>
+          </p:cNvSpPr>
+          <p:nvPr>
+            <p:ph type="title"/>
+          </p:nvPr>
+        </p:nvSpPr>
+        <p:spPr>
+          <a:xfrm>
+            <a:off x="76200" y="152400"/>
+            <a:ext cx="8991600" cy="671400"/>
+          </a:xfrm>
+          <a:prstGeom prst="rect">
+            <a:avLst/>
+          </a:prstGeom>
+        </p:spPr>
+        <p:txBody>
+          <a:bodyPr lIns="91425" tIns="91425" rIns="91425" bIns="91425" anchor="ctr" anchorCtr="0">
+            <a:noAutofit/>
+          </a:bodyPr>
+          <a:lstStyle/>
+          <a:p>
+            <a:pPr lvl="0">
+              <a:spcBef>
+                <a:spcPts val="0"/>
+              </a:spcBef>
+              <a:buNone/>
+            </a:pPr>
+            <a:r>
+              <a:rPr lang="en-US" dirty="0"/>
+              <a:t>Golang Playground</a:t>
+            </a:r>
+            <a:endParaRPr dirty="0"/>
+          </a:p>
+        </p:txBody>
+      </p:sp>
+      <p:sp>
+        <p:nvSpPr>
+          <p:cNvPr id="115" name="Shape 115"/>
+          <p:cNvSpPr txBox="1">
+            <a:spLocks noGrp="1"/>
+          </p:cNvSpPr>
+          <p:nvPr>
+            <p:ph type="body" idx="1"/>
+          </p:nvPr>
+        </p:nvSpPr>
+        <p:spPr>
+          <a:xfrm>
+            <a:off x="76200" y="1240810"/>
+            <a:ext cx="8991600" cy="4070929"/>
+          </a:xfrm>
+          <a:prstGeom prst="rect">
+            <a:avLst/>
+          </a:prstGeom>
+        </p:spPr>
+        <p:txBody>
+          <a:bodyPr lIns="91425" tIns="91425" rIns="91425" bIns="91425" anchor="t" anchorCtr="0">
+            <a:noAutofit/>
+          </a:bodyPr>
+          <a:lstStyle/>
+          <a:p>
+            <a:pPr lvl="2">
+              <a:spcBef>
+                <a:spcPts val="0"/>
+              </a:spcBef>
+            </a:pPr>
+            <a:r>
+              <a:rPr lang="en-US" dirty="0">
+                <a:solidFill>
+                  <a:schemeClr val="tx1"/>
+                </a:solidFill>
+                <a:latin typeface="+mn-lt"/>
+              </a:rPr>
+              <a:t>Before we dive deep into creating GO projects we need a fun environment in which to test our code before we drive it! Usually CLIs fill this role (and there </a:t>
+            </a:r>
+            <a:r>
+              <a:rPr lang="en-US" b="1" dirty="0">
+                <a:solidFill>
+                  <a:schemeClr val="tx1"/>
+                </a:solidFill>
+                <a:latin typeface="+mn-lt"/>
+              </a:rPr>
+              <a:t>are</a:t>
+            </a:r>
+            <a:r>
+              <a:rPr lang="en-US" dirty="0">
+                <a:solidFill>
+                  <a:schemeClr val="tx1"/>
+                </a:solidFill>
+                <a:latin typeface="+mn-lt"/>
+              </a:rPr>
+              <a:t> </a:t>
+            </a:r>
+            <a:r>
+              <a:rPr lang="en-US" dirty="0" err="1">
+                <a:solidFill>
+                  <a:schemeClr val="tx1"/>
+                </a:solidFill>
+                <a:latin typeface="+mn-lt"/>
+              </a:rPr>
+              <a:t>golang</a:t>
+            </a:r>
+            <a:r>
+              <a:rPr lang="en-US" dirty="0">
+                <a:solidFill>
+                  <a:schemeClr val="tx1"/>
+                </a:solidFill>
+                <a:latin typeface="+mn-lt"/>
+              </a:rPr>
+              <a:t> CLIs out there!)</a:t>
+            </a:r>
+          </a:p>
+          <a:p>
+            <a:pPr lvl="2">
+              <a:spcBef>
+                <a:spcPts val="0"/>
+              </a:spcBef>
+            </a:pPr>
+            <a:r>
+              <a:rPr lang="en-US" dirty="0">
+                <a:solidFill>
+                  <a:schemeClr val="tx1"/>
+                </a:solidFill>
+                <a:latin typeface="+mn-lt"/>
+              </a:rPr>
+              <a:t>With GO- navigate here: </a:t>
+            </a:r>
+            <a:r>
+              <a:rPr lang="en-US" dirty="0">
+                <a:solidFill>
+                  <a:srgbClr val="0070C0"/>
+                </a:solidFill>
+                <a:latin typeface="+mn-lt"/>
+              </a:rPr>
+              <a:t>https://</a:t>
+            </a:r>
+            <a:r>
+              <a:rPr lang="en-US" dirty="0" err="1">
+                <a:solidFill>
+                  <a:srgbClr val="0070C0"/>
+                </a:solidFill>
+                <a:latin typeface="+mn-lt"/>
+              </a:rPr>
+              <a:t>play.golang.org</a:t>
+            </a:r>
+            <a:r>
+              <a:rPr lang="en-US" dirty="0">
+                <a:solidFill>
+                  <a:srgbClr val="0070C0"/>
+                </a:solidFill>
+                <a:latin typeface="+mn-lt"/>
+              </a:rPr>
+              <a:t>/</a:t>
+            </a:r>
+          </a:p>
+          <a:p>
+            <a:pPr lvl="3">
+              <a:spcBef>
+                <a:spcPts val="0"/>
+              </a:spcBef>
+            </a:pPr>
+            <a:r>
+              <a:rPr lang="en-US" dirty="0">
+                <a:solidFill>
+                  <a:schemeClr val="tx1"/>
+                </a:solidFill>
+                <a:latin typeface="+mn-lt"/>
+              </a:rPr>
+              <a:t>Usually, as a coder, when I need to test something this is the first location I head to. It’s a nice little testing area </a:t>
+            </a:r>
+            <a:r>
+              <a:rPr lang="en-US" b="1" dirty="0">
+                <a:solidFill>
+                  <a:schemeClr val="tx1"/>
+                </a:solidFill>
+                <a:latin typeface="+mn-lt"/>
+              </a:rPr>
+              <a:t>and</a:t>
+            </a:r>
+            <a:r>
+              <a:rPr lang="en-US" dirty="0">
+                <a:solidFill>
+                  <a:schemeClr val="tx1"/>
+                </a:solidFill>
+                <a:latin typeface="+mn-lt"/>
+              </a:rPr>
+              <a:t> because of the easy “share” feature at the top- I can instantly create a link</a:t>
+            </a:r>
+          </a:p>
+          <a:p>
+            <a:pPr lvl="3">
+              <a:spcBef>
+                <a:spcPts val="0"/>
+              </a:spcBef>
+            </a:pPr>
+            <a:endParaRPr lang="en-US" dirty="0">
+              <a:solidFill>
+                <a:schemeClr val="tx1"/>
+              </a:solidFill>
+              <a:latin typeface="+mn-lt"/>
+            </a:endParaRPr>
+          </a:p>
+          <a:p>
+            <a:pPr lvl="2">
+              <a:spcBef>
+                <a:spcPts val="0"/>
+              </a:spcBef>
+            </a:pPr>
+            <a:endParaRPr lang="en-US" dirty="0">
+              <a:solidFill>
+                <a:schemeClr val="tx1"/>
+              </a:solidFill>
+            </a:endParaRPr>
+          </a:p>
+          <a:p>
+            <a:pPr marL="1485900" lvl="3" indent="0">
+              <a:spcBef>
+                <a:spcPts val="0"/>
+              </a:spcBef>
+              <a:buNone/>
+            </a:pPr>
+            <a:endParaRPr lang="en-US" dirty="0">
+              <a:solidFill>
+                <a:schemeClr val="tx1"/>
+              </a:solidFill>
+              <a:latin typeface="+mn-lt"/>
+            </a:endParaRPr>
+          </a:p>
+          <a:p>
+            <a:pPr marL="1485900" lvl="3" indent="0">
+              <a:spcBef>
+                <a:spcPts val="0"/>
+              </a:spcBef>
+              <a:buNone/>
+            </a:pPr>
+            <a:endParaRPr lang="en-US" dirty="0">
+              <a:solidFill>
+                <a:schemeClr val="tx1"/>
+              </a:solidFill>
+              <a:latin typeface="+mn-lt"/>
+            </a:endParaRPr>
+          </a:p>
+          <a:p>
+            <a:pPr marL="1485900" lvl="3" indent="0">
+              <a:spcBef>
+                <a:spcPts val="0"/>
+              </a:spcBef>
+              <a:buNone/>
+            </a:pPr>
+            <a:endParaRPr lang="en-US" dirty="0">
+              <a:solidFill>
+                <a:schemeClr val="tx1"/>
+              </a:solidFill>
+              <a:latin typeface="+mn-lt"/>
+            </a:endParaRPr>
+          </a:p>
+          <a:p>
+            <a:pPr marL="1485900" lvl="3" indent="0">
+              <a:spcBef>
+                <a:spcPts val="0"/>
+              </a:spcBef>
+              <a:buNone/>
+            </a:pPr>
+            <a:endParaRPr lang="en-US" dirty="0">
+              <a:solidFill>
+                <a:schemeClr val="tx1"/>
+              </a:solidFill>
+              <a:latin typeface="+mn-lt"/>
+            </a:endParaRPr>
+          </a:p>
+          <a:p>
+            <a:pPr marL="1485900" lvl="3" indent="0">
+              <a:spcBef>
+                <a:spcPts val="0"/>
+              </a:spcBef>
+              <a:buNone/>
+            </a:pPr>
+            <a:endParaRPr lang="en-US" dirty="0">
+              <a:solidFill>
+                <a:schemeClr val="tx1"/>
+              </a:solidFill>
+              <a:latin typeface="+mn-lt"/>
+            </a:endParaRPr>
+          </a:p>
+        </p:txBody>
+      </p:sp>
+      <p:pic>
+        <p:nvPicPr>
+          <p:cNvPr id="12292" name="Picture 4" descr="Image result for golang go playground">
+            <a:extLst>
+              <a:ext uri="{FF2B5EF4-FFF2-40B4-BE49-F238E27FC236}">
+                <a16:creationId xmlns:a16="http://schemas.microsoft.com/office/drawing/2014/main" id="{F24EBB5E-C392-5548-A507-0E4206042AD8}"/>
+              </a:ext>
+            </a:extLst>
+          </p:cNvPr>
+          <p:cNvPicPr>
+            <a:picLocks noChangeAspect="1" noChangeArrowheads="1"/>
+          </p:cNvPicPr>
+          <p:nvPr/>
+        </p:nvPicPr>
+        <p:blipFill>
+          <a:blip r:embed="rId3">
+            <a:extLst>
+              <a:ext uri="{28A0092B-C50C-407E-A947-70E740481C1C}">
+                <a14:useLocalDpi xmlns:a14="http://schemas.microsoft.com/office/drawing/2010/main" val="0"/>
+              </a:ext>
+            </a:extLst>
+          </a:blip>
+          <a:srcRect/>
+          <a:stretch>
+            <a:fillRect/>
+          </a:stretch>
+        </p:blipFill>
+        <p:spPr bwMode="auto">
+          <a:xfrm>
+            <a:off x="1552253" y="3748782"/>
+            <a:ext cx="5845139" cy="2710019"/>
+          </a:xfrm>
+          <a:prstGeom prst="rect">
+            <a:avLst/>
+          </a:prstGeom>
+          <a:noFill/>
+          <a:extLst>
+            <a:ext uri="{909E8E84-426E-40DD-AFC4-6F175D3DCCD1}">
+              <a14:hiddenFill xmlns:a14="http://schemas.microsoft.com/office/drawing/2010/main">
+                <a:solidFill>
+                  <a:srgbClr val="FFFFFF"/>
+                </a:solidFill>
+              </a14:hiddenFill>
+            </a:ext>
+          </a:extLst>
+        </p:spPr>
+      </p:pic>
+    </p:spTree>
+    <p:extLst>
+      <p:ext uri="{BB962C8B-B14F-4D97-AF65-F5344CB8AC3E}">
+        <p14:creationId xmlns:p14="http://schemas.microsoft.com/office/powerpoint/2010/main" val="522103369"/>
+      </p:ext>
+    </p:extLst>
+  </p:cSld>
+  <p:clrMapOvr>
+    <a:masterClrMapping/>
+  </p:clrMapOvr>
+</p:sld>
+</file>
+
+<file path=ppt/slides/slide47.xml><?xml version="1.0" encoding="utf-8"?>
+<p:sld xmlns:a="http://schemas.openxmlformats.org/drawingml/2006/main" xmlns:r="http://schemas.openxmlformats.org/officeDocument/2006/relationships" xmlns:p="http://schemas.openxmlformats.org/presentationml/2006/main">
+  <p:cSld>
+    <p:spTree>
+      <p:nvGrpSpPr>
+        <p:cNvPr id="1" name="Shape 113"/>
+        <p:cNvGrpSpPr/>
+        <p:nvPr/>
+      </p:nvGrpSpPr>
+      <p:grpSpPr>
+        <a:xfrm>
+          <a:off x="0" y="0"/>
+          <a:ext cx="0" cy="0"/>
+          <a:chOff x="0" y="0"/>
+          <a:chExt cx="0" cy="0"/>
+        </a:xfrm>
+      </p:grpSpPr>
+      <p:sp>
+        <p:nvSpPr>
+          <p:cNvPr id="114" name="Shape 114"/>
+          <p:cNvSpPr txBox="1">
+            <a:spLocks noGrp="1"/>
+          </p:cNvSpPr>
+          <p:nvPr>
+            <p:ph type="title"/>
+          </p:nvPr>
+        </p:nvSpPr>
+        <p:spPr>
+          <a:xfrm>
+            <a:off x="76200" y="152400"/>
+            <a:ext cx="8991600" cy="671400"/>
+          </a:xfrm>
+          <a:prstGeom prst="rect">
+            <a:avLst/>
+          </a:prstGeom>
+        </p:spPr>
+        <p:txBody>
+          <a:bodyPr lIns="91425" tIns="91425" rIns="91425" bIns="91425" anchor="ctr" anchorCtr="0">
+            <a:noAutofit/>
+          </a:bodyPr>
+          <a:lstStyle/>
+          <a:p>
+            <a:pPr lvl="0">
+              <a:spcBef>
+                <a:spcPts val="0"/>
+              </a:spcBef>
+              <a:buNone/>
+            </a:pPr>
+            <a:r>
+              <a:rPr lang="en-US" dirty="0"/>
+              <a:t>Golang Playground</a:t>
+            </a:r>
+            <a:endParaRPr dirty="0"/>
+          </a:p>
+        </p:txBody>
+      </p:sp>
+      <p:sp>
+        <p:nvSpPr>
+          <p:cNvPr id="115" name="Shape 115"/>
+          <p:cNvSpPr txBox="1">
+            <a:spLocks noGrp="1"/>
+          </p:cNvSpPr>
+          <p:nvPr>
+            <p:ph type="body" idx="1"/>
+          </p:nvPr>
+        </p:nvSpPr>
+        <p:spPr>
+          <a:xfrm>
+            <a:off x="76200" y="1240810"/>
+            <a:ext cx="8991600" cy="4070929"/>
+          </a:xfrm>
+          <a:prstGeom prst="rect">
+            <a:avLst/>
+          </a:prstGeom>
+        </p:spPr>
+        <p:txBody>
+          <a:bodyPr lIns="91425" tIns="91425" rIns="91425" bIns="91425" anchor="t" anchorCtr="0">
+            <a:noAutofit/>
+          </a:bodyPr>
+          <a:lstStyle/>
+          <a:p>
+            <a:pPr lvl="2">
+              <a:spcBef>
+                <a:spcPts val="0"/>
+              </a:spcBef>
+            </a:pPr>
+            <a:r>
+              <a:rPr lang="en-US" dirty="0">
+                <a:solidFill>
+                  <a:schemeClr val="tx1"/>
+                </a:solidFill>
+                <a:latin typeface="+mn-lt"/>
+              </a:rPr>
+              <a:t>Now- there ARE huge drawbacks to the GO playground in it’s current implementation. They include the following:</a:t>
+            </a:r>
+          </a:p>
+          <a:p>
+            <a:pPr lvl="3">
+              <a:spcBef>
+                <a:spcPts val="0"/>
+              </a:spcBef>
+            </a:pPr>
+            <a:r>
+              <a:rPr lang="en-US" dirty="0">
+                <a:solidFill>
+                  <a:schemeClr val="tx1"/>
+                </a:solidFill>
+                <a:latin typeface="+mn-lt"/>
+              </a:rPr>
+              <a:t>The big one is </a:t>
+            </a:r>
+            <a:r>
+              <a:rPr lang="en-US" b="1" dirty="0">
+                <a:solidFill>
+                  <a:schemeClr val="tx1"/>
+                </a:solidFill>
+                <a:latin typeface="+mn-lt"/>
+              </a:rPr>
+              <a:t>no third party package imports</a:t>
+            </a:r>
+            <a:r>
+              <a:rPr lang="en-US" dirty="0">
+                <a:solidFill>
+                  <a:schemeClr val="tx1"/>
+                </a:solidFill>
+                <a:latin typeface="+mn-lt"/>
+              </a:rPr>
+              <a:t> which REALLY cripples it (it’s nice in Python that I can simply run </a:t>
+            </a:r>
+            <a:r>
+              <a:rPr lang="en-US" b="1" dirty="0">
+                <a:solidFill>
+                  <a:schemeClr val="tx1"/>
+                </a:solidFill>
+                <a:latin typeface="+mn-lt"/>
+              </a:rPr>
+              <a:t>pip install whatever</a:t>
+            </a:r>
+            <a:r>
+              <a:rPr lang="en-US" dirty="0">
+                <a:solidFill>
+                  <a:schemeClr val="tx1"/>
+                </a:solidFill>
+                <a:latin typeface="+mn-lt"/>
+              </a:rPr>
+              <a:t> then go into my command line and </a:t>
+            </a:r>
+            <a:r>
+              <a:rPr lang="en-US" b="1" dirty="0">
+                <a:solidFill>
+                  <a:schemeClr val="tx1"/>
+                </a:solidFill>
+                <a:latin typeface="+mn-lt"/>
+              </a:rPr>
+              <a:t>import whatever</a:t>
+            </a:r>
+            <a:r>
+              <a:rPr lang="en-US" dirty="0">
+                <a:solidFill>
+                  <a:schemeClr val="tx1"/>
+                </a:solidFill>
+                <a:latin typeface="+mn-lt"/>
+              </a:rPr>
+              <a:t>). </a:t>
+            </a:r>
+          </a:p>
+          <a:p>
+            <a:pPr lvl="3">
+              <a:spcBef>
+                <a:spcPts val="0"/>
+              </a:spcBef>
+            </a:pPr>
+            <a:r>
+              <a:rPr lang="en-US" dirty="0">
+                <a:solidFill>
+                  <a:schemeClr val="tx1"/>
+                </a:solidFill>
+                <a:latin typeface="+mn-lt"/>
+              </a:rPr>
+              <a:t>There are time and memory limits set up on it.</a:t>
+            </a:r>
+          </a:p>
+          <a:p>
+            <a:pPr lvl="3">
+              <a:spcBef>
+                <a:spcPts val="0"/>
+              </a:spcBef>
+            </a:pPr>
+            <a:r>
+              <a:rPr lang="en-US" dirty="0">
+                <a:solidFill>
+                  <a:schemeClr val="tx1"/>
+                </a:solidFill>
+                <a:latin typeface="+mn-lt"/>
+              </a:rPr>
+              <a:t>The time begins at 2009-11-10 23:00:00 UTC…which is just </a:t>
+            </a:r>
+            <a:r>
+              <a:rPr lang="en-US" b="1" dirty="0">
+                <a:solidFill>
+                  <a:schemeClr val="tx1"/>
+                </a:solidFill>
+                <a:latin typeface="+mn-lt"/>
+              </a:rPr>
+              <a:t>really weird</a:t>
+            </a:r>
+            <a:r>
+              <a:rPr lang="en-US" dirty="0">
+                <a:solidFill>
+                  <a:schemeClr val="tx1"/>
+                </a:solidFill>
+                <a:latin typeface="+mn-lt"/>
+              </a:rPr>
+              <a:t>.</a:t>
+            </a:r>
+          </a:p>
+          <a:p>
+            <a:pPr lvl="2">
+              <a:spcBef>
+                <a:spcPts val="0"/>
+              </a:spcBef>
+            </a:pPr>
+            <a:r>
+              <a:rPr lang="en-US" dirty="0">
+                <a:solidFill>
+                  <a:schemeClr val="tx1"/>
+                </a:solidFill>
+                <a:latin typeface="+mn-lt"/>
+              </a:rPr>
+              <a:t>That being said- it’s nice to be an instructor and know that all of my students (for the practical portion) are on the same </a:t>
+            </a:r>
+            <a:r>
+              <a:rPr lang="en-US" dirty="0" err="1">
+                <a:solidFill>
+                  <a:schemeClr val="tx1"/>
+                </a:solidFill>
+                <a:latin typeface="+mn-lt"/>
+              </a:rPr>
+              <a:t>gui</a:t>
+            </a:r>
+            <a:r>
+              <a:rPr lang="en-US" dirty="0">
+                <a:solidFill>
+                  <a:schemeClr val="tx1"/>
+                </a:solidFill>
+                <a:latin typeface="+mn-lt"/>
+              </a:rPr>
+              <a:t> (basically). </a:t>
+            </a:r>
+          </a:p>
+          <a:p>
+            <a:pPr lvl="3">
+              <a:spcBef>
+                <a:spcPts val="0"/>
+              </a:spcBef>
+            </a:pPr>
+            <a:endParaRPr lang="en-US" dirty="0">
+              <a:solidFill>
+                <a:schemeClr val="tx1"/>
+              </a:solidFill>
+              <a:latin typeface="+mn-lt"/>
+            </a:endParaRPr>
+          </a:p>
+          <a:p>
+            <a:pPr lvl="2">
+              <a:spcBef>
+                <a:spcPts val="0"/>
+              </a:spcBef>
+            </a:pPr>
+            <a:endParaRPr lang="en-US" dirty="0">
+              <a:solidFill>
+                <a:schemeClr val="tx1"/>
+              </a:solidFill>
+            </a:endParaRPr>
+          </a:p>
+          <a:p>
+            <a:pPr marL="1485900" lvl="3" indent="0">
+              <a:spcBef>
+                <a:spcPts val="0"/>
+              </a:spcBef>
+              <a:buNone/>
+            </a:pPr>
+            <a:endParaRPr lang="en-US" dirty="0">
+              <a:solidFill>
+                <a:schemeClr val="tx1"/>
+              </a:solidFill>
+              <a:latin typeface="+mn-lt"/>
+            </a:endParaRPr>
+          </a:p>
+          <a:p>
+            <a:pPr marL="1485900" lvl="3" indent="0">
+              <a:spcBef>
+                <a:spcPts val="0"/>
+              </a:spcBef>
+              <a:buNone/>
+            </a:pPr>
+            <a:endParaRPr lang="en-US" dirty="0">
+              <a:solidFill>
+                <a:schemeClr val="tx1"/>
+              </a:solidFill>
+              <a:latin typeface="+mn-lt"/>
+            </a:endParaRPr>
+          </a:p>
+          <a:p>
+            <a:pPr marL="1485900" lvl="3" indent="0">
+              <a:spcBef>
+                <a:spcPts val="0"/>
+              </a:spcBef>
+              <a:buNone/>
+            </a:pPr>
+            <a:endParaRPr lang="en-US" dirty="0">
+              <a:solidFill>
+                <a:schemeClr val="tx1"/>
+              </a:solidFill>
+              <a:latin typeface="+mn-lt"/>
+            </a:endParaRPr>
+          </a:p>
+          <a:p>
+            <a:pPr marL="1485900" lvl="3" indent="0">
+              <a:spcBef>
+                <a:spcPts val="0"/>
+              </a:spcBef>
+              <a:buNone/>
+            </a:pPr>
+            <a:endParaRPr lang="en-US" dirty="0">
+              <a:solidFill>
+                <a:schemeClr val="tx1"/>
+              </a:solidFill>
+              <a:latin typeface="+mn-lt"/>
+            </a:endParaRPr>
+          </a:p>
+          <a:p>
+            <a:pPr marL="1485900" lvl="3" indent="0">
+              <a:spcBef>
+                <a:spcPts val="0"/>
+              </a:spcBef>
+              <a:buNone/>
+            </a:pPr>
+            <a:endParaRPr lang="en-US" dirty="0">
+              <a:solidFill>
+                <a:schemeClr val="tx1"/>
+              </a:solidFill>
+              <a:latin typeface="+mn-lt"/>
+            </a:endParaRPr>
+          </a:p>
+        </p:txBody>
+      </p:sp>
+      <p:pic>
+        <p:nvPicPr>
+          <p:cNvPr id="13314" name="Picture 2" descr="Image result for golang go playground">
+            <a:extLst>
+              <a:ext uri="{FF2B5EF4-FFF2-40B4-BE49-F238E27FC236}">
+                <a16:creationId xmlns:a16="http://schemas.microsoft.com/office/drawing/2014/main" id="{F3687B55-4ECF-9047-8F9A-388DDDC554DB}"/>
+              </a:ext>
+            </a:extLst>
+          </p:cNvPr>
+          <p:cNvPicPr>
+            <a:picLocks noChangeAspect="1" noChangeArrowheads="1"/>
+          </p:cNvPicPr>
+          <p:nvPr/>
+        </p:nvPicPr>
+        <p:blipFill>
+          <a:blip r:embed="rId3">
+            <a:extLst>
+              <a:ext uri="{28A0092B-C50C-407E-A947-70E740481C1C}">
+                <a14:useLocalDpi xmlns:a14="http://schemas.microsoft.com/office/drawing/2010/main" val="0"/>
+              </a:ext>
+            </a:extLst>
+          </a:blip>
+          <a:srcRect/>
+          <a:stretch>
+            <a:fillRect/>
+          </a:stretch>
+        </p:blipFill>
+        <p:spPr bwMode="auto">
+          <a:xfrm>
+            <a:off x="3657600" y="4397339"/>
+            <a:ext cx="2184400" cy="2184400"/>
+          </a:xfrm>
+          <a:prstGeom prst="rect">
+            <a:avLst/>
+          </a:prstGeom>
+          <a:noFill/>
+          <a:extLst>
+            <a:ext uri="{909E8E84-426E-40DD-AFC4-6F175D3DCCD1}">
+              <a14:hiddenFill xmlns:a14="http://schemas.microsoft.com/office/drawing/2010/main">
+                <a:solidFill>
+                  <a:srgbClr val="FFFFFF"/>
+                </a:solidFill>
+              </a14:hiddenFill>
+            </a:ext>
+          </a:extLst>
+        </p:spPr>
+      </p:pic>
+    </p:spTree>
+    <p:extLst>
+      <p:ext uri="{BB962C8B-B14F-4D97-AF65-F5344CB8AC3E}">
+        <p14:creationId xmlns:p14="http://schemas.microsoft.com/office/powerpoint/2010/main" val="1104103585"/>
+      </p:ext>
+    </p:extLst>
+  </p:cSld>
+  <p:clrMapOvr>
+    <a:masterClrMapping/>
+  </p:clrMapOvr>
+</p:sld>
+</file>
+
+<file path=ppt/slides/slide48.xml><?xml version="1.0" encoding="utf-8"?>
+<p:sld xmlns:a="http://schemas.openxmlformats.org/drawingml/2006/main" xmlns:r="http://schemas.openxmlformats.org/officeDocument/2006/relationships" xmlns:p="http://schemas.openxmlformats.org/presentationml/2006/main">
+  <p:cSld>
+    <p:spTree>
+      <p:nvGrpSpPr>
+        <p:cNvPr id="1" name="Shape 113"/>
+        <p:cNvGrpSpPr/>
+        <p:nvPr/>
+      </p:nvGrpSpPr>
+      <p:grpSpPr>
+        <a:xfrm>
+          <a:off x="0" y="0"/>
+          <a:ext cx="0" cy="0"/>
+          <a:chOff x="0" y="0"/>
+          <a:chExt cx="0" cy="0"/>
+        </a:xfrm>
+      </p:grpSpPr>
+      <p:sp>
+        <p:nvSpPr>
+          <p:cNvPr id="114" name="Shape 114"/>
+          <p:cNvSpPr txBox="1">
+            <a:spLocks noGrp="1"/>
+          </p:cNvSpPr>
+          <p:nvPr>
+            <p:ph type="title"/>
+          </p:nvPr>
+        </p:nvSpPr>
+        <p:spPr>
+          <a:xfrm>
+            <a:off x="76200" y="152400"/>
+            <a:ext cx="8991600" cy="671400"/>
+          </a:xfrm>
+          <a:prstGeom prst="rect">
+            <a:avLst/>
+          </a:prstGeom>
+        </p:spPr>
+        <p:txBody>
+          <a:bodyPr lIns="91425" tIns="91425" rIns="91425" bIns="91425" anchor="ctr" anchorCtr="0">
+            <a:noAutofit/>
+          </a:bodyPr>
+          <a:lstStyle/>
+          <a:p>
+            <a:pPr lvl="0">
+              <a:spcBef>
+                <a:spcPts val="0"/>
+              </a:spcBef>
+              <a:buNone/>
+            </a:pPr>
+            <a:r>
+              <a:rPr lang="en-US" dirty="0"/>
+              <a:t>Golang Playground</a:t>
+            </a:r>
+            <a:endParaRPr dirty="0"/>
+          </a:p>
+        </p:txBody>
+      </p:sp>
+      <p:sp>
+        <p:nvSpPr>
+          <p:cNvPr id="115" name="Shape 115"/>
+          <p:cNvSpPr txBox="1">
+            <a:spLocks noGrp="1"/>
+          </p:cNvSpPr>
+          <p:nvPr>
+            <p:ph type="body" idx="1"/>
+          </p:nvPr>
+        </p:nvSpPr>
+        <p:spPr>
+          <a:xfrm>
+            <a:off x="76200" y="1240810"/>
+            <a:ext cx="8991600" cy="4070929"/>
+          </a:xfrm>
+          <a:prstGeom prst="rect">
+            <a:avLst/>
+          </a:prstGeom>
+        </p:spPr>
+        <p:txBody>
+          <a:bodyPr lIns="91425" tIns="91425" rIns="91425" bIns="91425" anchor="t" anchorCtr="0">
+            <a:noAutofit/>
+          </a:bodyPr>
+          <a:lstStyle/>
+          <a:p>
+            <a:pPr lvl="2">
+              <a:spcBef>
+                <a:spcPts val="0"/>
+              </a:spcBef>
+            </a:pPr>
+            <a:r>
+              <a:rPr lang="en-US" dirty="0">
+                <a:solidFill>
+                  <a:schemeClr val="tx1"/>
+                </a:solidFill>
+                <a:latin typeface="+mn-lt"/>
+              </a:rPr>
+              <a:t>All of this being said- this is what we’re going to use going forward for most of our intro coding!</a:t>
+            </a:r>
+          </a:p>
+          <a:p>
+            <a:pPr lvl="2">
+              <a:spcBef>
+                <a:spcPts val="0"/>
+              </a:spcBef>
+            </a:pPr>
+            <a:r>
+              <a:rPr lang="en-US" dirty="0">
+                <a:solidFill>
+                  <a:schemeClr val="tx1"/>
+                </a:solidFill>
+                <a:latin typeface="+mn-lt"/>
+              </a:rPr>
+              <a:t>We are now set up and ready to ”go!”</a:t>
+            </a:r>
+          </a:p>
+          <a:p>
+            <a:pPr lvl="2">
+              <a:spcBef>
+                <a:spcPts val="0"/>
+              </a:spcBef>
+            </a:pPr>
+            <a:r>
+              <a:rPr lang="en-US" dirty="0">
+                <a:solidFill>
+                  <a:schemeClr val="tx1"/>
+                </a:solidFill>
+                <a:latin typeface="+mn-lt"/>
+              </a:rPr>
+              <a:t> </a:t>
+            </a:r>
+            <a:r>
+              <a:rPr lang="en-US" sz="3200" dirty="0">
+                <a:solidFill>
+                  <a:schemeClr val="tx1"/>
+                </a:solidFill>
+                <a:latin typeface="+mn-lt"/>
+              </a:rPr>
+              <a:t>ANY QUESTIONS?!?</a:t>
+            </a:r>
+          </a:p>
+          <a:p>
+            <a:pPr lvl="3">
+              <a:spcBef>
+                <a:spcPts val="0"/>
+              </a:spcBef>
+            </a:pPr>
+            <a:endParaRPr lang="en-US" dirty="0">
+              <a:solidFill>
+                <a:schemeClr val="tx1"/>
+              </a:solidFill>
+              <a:latin typeface="+mn-lt"/>
+            </a:endParaRPr>
+          </a:p>
+          <a:p>
+            <a:pPr lvl="2">
+              <a:spcBef>
+                <a:spcPts val="0"/>
+              </a:spcBef>
+            </a:pPr>
+            <a:endParaRPr lang="en-US" dirty="0">
+              <a:solidFill>
+                <a:schemeClr val="tx1"/>
+              </a:solidFill>
+            </a:endParaRPr>
+          </a:p>
+          <a:p>
+            <a:pPr marL="1485900" lvl="3" indent="0">
+              <a:spcBef>
+                <a:spcPts val="0"/>
+              </a:spcBef>
+              <a:buNone/>
+            </a:pPr>
+            <a:endParaRPr lang="en-US" dirty="0">
+              <a:solidFill>
+                <a:schemeClr val="tx1"/>
+              </a:solidFill>
+              <a:latin typeface="+mn-lt"/>
+            </a:endParaRPr>
+          </a:p>
+          <a:p>
+            <a:pPr marL="1485900" lvl="3" indent="0">
+              <a:spcBef>
+                <a:spcPts val="0"/>
+              </a:spcBef>
+              <a:buNone/>
+            </a:pPr>
+            <a:endParaRPr lang="en-US" dirty="0">
+              <a:solidFill>
+                <a:schemeClr val="tx1"/>
+              </a:solidFill>
+              <a:latin typeface="+mn-lt"/>
+            </a:endParaRPr>
+          </a:p>
+          <a:p>
+            <a:pPr marL="1485900" lvl="3" indent="0">
+              <a:spcBef>
+                <a:spcPts val="0"/>
+              </a:spcBef>
+              <a:buNone/>
+            </a:pPr>
+            <a:endParaRPr lang="en-US" dirty="0">
+              <a:solidFill>
+                <a:schemeClr val="tx1"/>
+              </a:solidFill>
+              <a:latin typeface="+mn-lt"/>
+            </a:endParaRPr>
+          </a:p>
+          <a:p>
+            <a:pPr marL="1485900" lvl="3" indent="0">
+              <a:spcBef>
+                <a:spcPts val="0"/>
+              </a:spcBef>
+              <a:buNone/>
+            </a:pPr>
+            <a:endParaRPr lang="en-US" dirty="0">
+              <a:solidFill>
+                <a:schemeClr val="tx1"/>
+              </a:solidFill>
+              <a:latin typeface="+mn-lt"/>
+            </a:endParaRPr>
+          </a:p>
+          <a:p>
+            <a:pPr marL="1485900" lvl="3" indent="0">
+              <a:spcBef>
+                <a:spcPts val="0"/>
+              </a:spcBef>
+              <a:buNone/>
+            </a:pPr>
+            <a:endParaRPr lang="en-US" dirty="0">
+              <a:solidFill>
+                <a:schemeClr val="tx1"/>
+              </a:solidFill>
+              <a:latin typeface="+mn-lt"/>
+            </a:endParaRPr>
+          </a:p>
+        </p:txBody>
+      </p:sp>
+      <p:pic>
+        <p:nvPicPr>
+          <p:cNvPr id="14338" name="Picture 2" descr="Image result for golang gopher, images">
+            <a:extLst>
+              <a:ext uri="{FF2B5EF4-FFF2-40B4-BE49-F238E27FC236}">
+                <a16:creationId xmlns:a16="http://schemas.microsoft.com/office/drawing/2014/main" id="{99F98B07-359E-7D45-BFB0-9CFB89F92F9B}"/>
+              </a:ext>
+            </a:extLst>
+          </p:cNvPr>
+          <p:cNvPicPr>
+            <a:picLocks noChangeAspect="1" noChangeArrowheads="1"/>
+          </p:cNvPicPr>
+          <p:nvPr/>
+        </p:nvPicPr>
+        <p:blipFill>
+          <a:blip r:embed="rId3">
+            <a:extLst>
+              <a:ext uri="{28A0092B-C50C-407E-A947-70E740481C1C}">
+                <a14:useLocalDpi xmlns:a14="http://schemas.microsoft.com/office/drawing/2010/main" val="0"/>
+              </a:ext>
+            </a:extLst>
+          </a:blip>
+          <a:srcRect/>
+          <a:stretch>
+            <a:fillRect/>
+          </a:stretch>
+        </p:blipFill>
+        <p:spPr bwMode="auto">
+          <a:xfrm>
+            <a:off x="3075040" y="3147245"/>
+            <a:ext cx="2603500" cy="3111500"/>
+          </a:xfrm>
+          <a:prstGeom prst="rect">
+            <a:avLst/>
+          </a:prstGeom>
+          <a:noFill/>
+          <a:extLst>
+            <a:ext uri="{909E8E84-426E-40DD-AFC4-6F175D3DCCD1}">
+              <a14:hiddenFill xmlns:a14="http://schemas.microsoft.com/office/drawing/2010/main">
+                <a:solidFill>
+                  <a:srgbClr val="FFFFFF"/>
+                </a:solidFill>
+              </a14:hiddenFill>
+            </a:ext>
+          </a:extLst>
+        </p:spPr>
+      </p:pic>
+    </p:spTree>
+    <p:extLst>
+      <p:ext uri="{BB962C8B-B14F-4D97-AF65-F5344CB8AC3E}">
+        <p14:creationId xmlns:p14="http://schemas.microsoft.com/office/powerpoint/2010/main" val="3120604218"/>
+      </p:ext>
+    </p:extLst>
+  </p:cSld>
+  <p:clrMapOvr>
+    <a:masterClrMapping/>
+  </p:clrMapOvr>
+</p:sld>
+</file>
+
+<file path=ppt/slides/slide49.xml><?xml version="1.0" encoding="utf-8"?>
+<p:sld xmlns:a="http://schemas.openxmlformats.org/drawingml/2006/main" xmlns:r="http://schemas.openxmlformats.org/officeDocument/2006/relationships" xmlns:p="http://schemas.openxmlformats.org/presentationml/2006/main">
+  <p:cSld>
+    <p:spTree>
+      <p:nvGrpSpPr>
+        <p:cNvPr id="1" name="Shape 113"/>
+        <p:cNvGrpSpPr/>
+        <p:nvPr/>
+      </p:nvGrpSpPr>
+      <p:grpSpPr>
+        <a:xfrm>
+          <a:off x="0" y="0"/>
+          <a:ext cx="0" cy="0"/>
+          <a:chOff x="0" y="0"/>
+          <a:chExt cx="0" cy="0"/>
+        </a:xfrm>
+      </p:grpSpPr>
+      <p:sp>
+        <p:nvSpPr>
+          <p:cNvPr id="114" name="Shape 114"/>
+          <p:cNvSpPr txBox="1">
+            <a:spLocks noGrp="1"/>
+          </p:cNvSpPr>
+          <p:nvPr>
+            <p:ph type="title"/>
+          </p:nvPr>
+        </p:nvSpPr>
+        <p:spPr>
+          <a:xfrm>
+            <a:off x="76200" y="152400"/>
+            <a:ext cx="8991600" cy="671400"/>
+          </a:xfrm>
+          <a:prstGeom prst="rect">
+            <a:avLst/>
+          </a:prstGeom>
+        </p:spPr>
+        <p:txBody>
+          <a:bodyPr lIns="91425" tIns="91425" rIns="91425" bIns="91425" anchor="ctr" anchorCtr="0">
+            <a:noAutofit/>
+          </a:bodyPr>
+          <a:lstStyle/>
+          <a:p>
+            <a:pPr lvl="0">
+              <a:spcBef>
+                <a:spcPts val="0"/>
+              </a:spcBef>
+              <a:buNone/>
+            </a:pPr>
+            <a:r>
+              <a:rPr lang="en-US" dirty="0"/>
+              <a:t>REVIEW</a:t>
+            </a:r>
+            <a:endParaRPr dirty="0"/>
+          </a:p>
+        </p:txBody>
+      </p:sp>
+      <p:sp>
+        <p:nvSpPr>
+          <p:cNvPr id="115" name="Shape 115"/>
+          <p:cNvSpPr txBox="1">
+            <a:spLocks noGrp="1"/>
+          </p:cNvSpPr>
+          <p:nvPr>
+            <p:ph type="body" idx="1"/>
+          </p:nvPr>
+        </p:nvSpPr>
+        <p:spPr>
+          <a:xfrm>
+            <a:off x="76200" y="1281906"/>
+            <a:ext cx="8991600" cy="4070929"/>
+          </a:xfrm>
+          <a:prstGeom prst="rect">
+            <a:avLst/>
+          </a:prstGeom>
+        </p:spPr>
+        <p:txBody>
+          <a:bodyPr lIns="91425" tIns="91425" rIns="91425" bIns="91425" anchor="t" anchorCtr="0">
+            <a:noAutofit/>
+          </a:bodyPr>
+          <a:lstStyle/>
+          <a:p>
+            <a:pPr>
+              <a:spcBef>
+                <a:spcPts val="0"/>
+              </a:spcBef>
+            </a:pPr>
+            <a:r>
+              <a:rPr lang="en-US" dirty="0">
+                <a:solidFill>
+                  <a:schemeClr val="tx1"/>
+                </a:solidFill>
+                <a:latin typeface="+mn-lt"/>
+              </a:rPr>
+              <a:t> GO is a </a:t>
+            </a:r>
+            <a:r>
+              <a:rPr lang="en-US" b="1" dirty="0">
+                <a:solidFill>
+                  <a:schemeClr val="tx1"/>
+                </a:solidFill>
+                <a:latin typeface="+mn-lt"/>
+              </a:rPr>
+              <a:t>statically typed, compiled</a:t>
+            </a:r>
+            <a:r>
+              <a:rPr lang="en-US" dirty="0">
+                <a:solidFill>
+                  <a:schemeClr val="tx1"/>
+                </a:solidFill>
+                <a:latin typeface="+mn-lt"/>
+              </a:rPr>
+              <a:t> language developed at GOOGLE</a:t>
+            </a:r>
+          </a:p>
+          <a:p>
+            <a:pPr>
+              <a:spcBef>
+                <a:spcPts val="0"/>
+              </a:spcBef>
+            </a:pPr>
+            <a:r>
+              <a:rPr lang="en-US" dirty="0">
+                <a:solidFill>
+                  <a:schemeClr val="tx1"/>
+                </a:solidFill>
+                <a:latin typeface="+mn-lt"/>
+              </a:rPr>
+              <a:t> GO depends on </a:t>
+            </a:r>
+            <a:r>
+              <a:rPr lang="en-US" b="1" dirty="0">
+                <a:solidFill>
+                  <a:schemeClr val="tx1"/>
+                </a:solidFill>
+                <a:latin typeface="+mn-lt"/>
+              </a:rPr>
+              <a:t>type safety</a:t>
+            </a:r>
+            <a:r>
+              <a:rPr lang="en-US" dirty="0">
+                <a:solidFill>
+                  <a:schemeClr val="tx1"/>
+                </a:solidFill>
+                <a:latin typeface="+mn-lt"/>
+              </a:rPr>
+              <a:t> so </a:t>
+            </a:r>
+            <a:r>
+              <a:rPr lang="en-US" b="1" dirty="0">
+                <a:solidFill>
+                  <a:schemeClr val="tx1"/>
+                </a:solidFill>
+                <a:latin typeface="+mn-lt"/>
+              </a:rPr>
+              <a:t>no generics</a:t>
+            </a:r>
+            <a:endParaRPr lang="en-US" dirty="0">
+              <a:solidFill>
+                <a:schemeClr val="tx1"/>
+              </a:solidFill>
+              <a:latin typeface="+mn-lt"/>
+            </a:endParaRPr>
+          </a:p>
+          <a:p>
+            <a:pPr>
+              <a:spcBef>
+                <a:spcPts val="0"/>
+              </a:spcBef>
+            </a:pPr>
+            <a:r>
+              <a:rPr lang="en-US" dirty="0">
+                <a:solidFill>
+                  <a:schemeClr val="tx1"/>
+                </a:solidFill>
+                <a:latin typeface="+mn-lt"/>
+              </a:rPr>
+              <a:t> GO has </a:t>
+            </a:r>
+            <a:r>
+              <a:rPr lang="en-US" b="1" dirty="0">
+                <a:solidFill>
+                  <a:schemeClr val="tx1"/>
+                </a:solidFill>
+                <a:latin typeface="+mn-lt"/>
+              </a:rPr>
+              <a:t>No Type Hierarchy</a:t>
+            </a:r>
+          </a:p>
+          <a:p>
+            <a:pPr>
+              <a:spcBef>
+                <a:spcPts val="0"/>
+              </a:spcBef>
+            </a:pPr>
+            <a:r>
+              <a:rPr lang="en-US" b="1" dirty="0">
+                <a:solidFill>
+                  <a:schemeClr val="tx1"/>
+                </a:solidFill>
+                <a:latin typeface="+mn-lt"/>
+              </a:rPr>
+              <a:t> </a:t>
+            </a:r>
+            <a:r>
+              <a:rPr lang="en-US" dirty="0">
+                <a:solidFill>
+                  <a:schemeClr val="tx1"/>
+                </a:solidFill>
+                <a:latin typeface="+mn-lt"/>
+              </a:rPr>
+              <a:t>GO uses </a:t>
+            </a:r>
+            <a:r>
+              <a:rPr lang="en-US" b="1" dirty="0">
+                <a:solidFill>
+                  <a:schemeClr val="tx1"/>
+                </a:solidFill>
+                <a:latin typeface="+mn-lt"/>
+              </a:rPr>
+              <a:t>structs</a:t>
+            </a:r>
+            <a:r>
+              <a:rPr lang="en-US" dirty="0">
+                <a:solidFill>
+                  <a:schemeClr val="tx1"/>
+                </a:solidFill>
+                <a:latin typeface="+mn-lt"/>
+              </a:rPr>
+              <a:t> instead of </a:t>
+            </a:r>
+            <a:r>
+              <a:rPr lang="en-US" b="1" dirty="0">
+                <a:solidFill>
+                  <a:schemeClr val="tx1"/>
+                </a:solidFill>
+                <a:latin typeface="+mn-lt"/>
+              </a:rPr>
+              <a:t>objects</a:t>
+            </a:r>
+            <a:r>
+              <a:rPr lang="en-US" dirty="0">
+                <a:solidFill>
+                  <a:schemeClr val="tx1"/>
+                </a:solidFill>
+                <a:latin typeface="+mn-lt"/>
+              </a:rPr>
+              <a:t> and </a:t>
+            </a:r>
+            <a:r>
+              <a:rPr lang="en-US" b="1" dirty="0">
+                <a:solidFill>
+                  <a:schemeClr val="tx1"/>
+                </a:solidFill>
+                <a:latin typeface="+mn-lt"/>
+              </a:rPr>
+              <a:t>interfaces </a:t>
+            </a:r>
+            <a:r>
+              <a:rPr lang="en-US" dirty="0">
+                <a:solidFill>
+                  <a:schemeClr val="tx1"/>
+                </a:solidFill>
+                <a:latin typeface="+mn-lt"/>
+              </a:rPr>
+              <a:t>to fake a </a:t>
+            </a:r>
+            <a:r>
+              <a:rPr lang="en-US" i="1" dirty="0">
+                <a:solidFill>
+                  <a:schemeClr val="tx1"/>
+                </a:solidFill>
+                <a:latin typeface="+mn-lt"/>
+              </a:rPr>
+              <a:t>type hierarchy</a:t>
+            </a:r>
+          </a:p>
+          <a:p>
+            <a:pPr>
+              <a:spcBef>
+                <a:spcPts val="0"/>
+              </a:spcBef>
+            </a:pPr>
+            <a:r>
+              <a:rPr lang="en-US" i="1" dirty="0">
+                <a:solidFill>
+                  <a:schemeClr val="tx1"/>
+                </a:solidFill>
+                <a:latin typeface="+mn-lt"/>
+              </a:rPr>
+              <a:t> </a:t>
+            </a:r>
+            <a:r>
+              <a:rPr lang="en-US" dirty="0">
+                <a:solidFill>
+                  <a:schemeClr val="tx1"/>
+                </a:solidFill>
+                <a:latin typeface="+mn-lt"/>
+              </a:rPr>
+              <a:t>GO uses a </a:t>
+            </a:r>
+            <a:r>
+              <a:rPr lang="en-US" b="1" dirty="0">
+                <a:solidFill>
+                  <a:schemeClr val="tx1"/>
+                </a:solidFill>
+                <a:latin typeface="+mn-lt"/>
+              </a:rPr>
+              <a:t>workspace</a:t>
+            </a:r>
+            <a:r>
+              <a:rPr lang="en-US" dirty="0">
+                <a:solidFill>
+                  <a:schemeClr val="tx1"/>
+                </a:solidFill>
+                <a:latin typeface="+mn-lt"/>
+              </a:rPr>
+              <a:t> that contains multiple </a:t>
+            </a:r>
+            <a:r>
+              <a:rPr lang="en-US" b="1" dirty="0">
+                <a:solidFill>
+                  <a:schemeClr val="tx1"/>
+                </a:solidFill>
+                <a:latin typeface="+mn-lt"/>
+              </a:rPr>
+              <a:t>packages</a:t>
+            </a:r>
+            <a:endParaRPr lang="en-US" dirty="0">
+              <a:solidFill>
+                <a:schemeClr val="tx1"/>
+              </a:solidFill>
+              <a:latin typeface="+mn-lt"/>
+            </a:endParaRPr>
+          </a:p>
+          <a:p>
+            <a:pPr lvl="2">
+              <a:spcBef>
+                <a:spcPts val="0"/>
+              </a:spcBef>
+            </a:pPr>
+            <a:endParaRPr lang="en-US" dirty="0">
+              <a:solidFill>
+                <a:schemeClr val="tx1"/>
+              </a:solidFill>
+            </a:endParaRPr>
+          </a:p>
+          <a:p>
+            <a:pPr lvl="3">
+              <a:spcBef>
+                <a:spcPts val="0"/>
+              </a:spcBef>
+            </a:pPr>
+            <a:endParaRPr lang="en-US" dirty="0">
+              <a:solidFill>
+                <a:schemeClr val="tx1"/>
+              </a:solidFill>
+              <a:latin typeface="+mn-lt"/>
+            </a:endParaRPr>
+          </a:p>
+          <a:p>
+            <a:pPr lvl="3">
+              <a:spcBef>
+                <a:spcPts val="0"/>
+              </a:spcBef>
+            </a:pPr>
+            <a:endParaRPr lang="en-US" dirty="0">
+              <a:solidFill>
+                <a:schemeClr val="tx1"/>
+              </a:solidFill>
+              <a:latin typeface="+mn-lt"/>
+            </a:endParaRPr>
+          </a:p>
+          <a:p>
+            <a:pPr lvl="3">
+              <a:spcBef>
+                <a:spcPts val="0"/>
+              </a:spcBef>
+            </a:pPr>
+            <a:endParaRPr lang="en-US" dirty="0">
+              <a:solidFill>
+                <a:schemeClr val="tx1"/>
+              </a:solidFill>
+              <a:latin typeface="+mn-lt"/>
+            </a:endParaRPr>
+          </a:p>
+          <a:p>
+            <a:pPr lvl="3">
+              <a:spcBef>
+                <a:spcPts val="0"/>
+              </a:spcBef>
+            </a:pPr>
+            <a:endParaRPr lang="en-US" dirty="0">
+              <a:solidFill>
+                <a:schemeClr val="tx1"/>
+              </a:solidFill>
+              <a:latin typeface="+mn-lt"/>
+            </a:endParaRPr>
+          </a:p>
+          <a:p>
+            <a:pPr lvl="3">
+              <a:spcBef>
+                <a:spcPts val="0"/>
+              </a:spcBef>
+            </a:pPr>
+            <a:endParaRPr lang="en-US" dirty="0">
+              <a:solidFill>
+                <a:schemeClr val="tx1"/>
+              </a:solidFill>
+              <a:latin typeface="+mn-lt"/>
+            </a:endParaRPr>
+          </a:p>
+        </p:txBody>
+      </p:sp>
+      <p:pic>
+        <p:nvPicPr>
+          <p:cNvPr id="1026" name="Picture 2" descr="Image result for golang gopher image">
+            <a:extLst>
+              <a:ext uri="{FF2B5EF4-FFF2-40B4-BE49-F238E27FC236}">
+                <a16:creationId xmlns:a16="http://schemas.microsoft.com/office/drawing/2014/main" id="{A8AE8788-B2E5-5F41-91B7-AC191FF7BCE2}"/>
+              </a:ext>
+            </a:extLst>
+          </p:cNvPr>
+          <p:cNvPicPr>
+            <a:picLocks noChangeAspect="1" noChangeArrowheads="1"/>
+          </p:cNvPicPr>
+          <p:nvPr/>
+        </p:nvPicPr>
+        <p:blipFill>
+          <a:blip r:embed="rId3">
+            <a:extLst>
+              <a:ext uri="{28A0092B-C50C-407E-A947-70E740481C1C}">
+                <a14:useLocalDpi xmlns:a14="http://schemas.microsoft.com/office/drawing/2010/main" val="0"/>
+              </a:ext>
+            </a:extLst>
+          </a:blip>
+          <a:srcRect/>
+          <a:stretch>
+            <a:fillRect/>
+          </a:stretch>
+        </p:blipFill>
+        <p:spPr bwMode="auto">
+          <a:xfrm>
+            <a:off x="3421294" y="4476964"/>
+            <a:ext cx="1921909" cy="1921909"/>
+          </a:xfrm>
+          <a:prstGeom prst="rect">
+            <a:avLst/>
+          </a:prstGeom>
+          <a:noFill/>
+          <a:extLst>
+            <a:ext uri="{909E8E84-426E-40DD-AFC4-6F175D3DCCD1}">
+              <a14:hiddenFill xmlns:a14="http://schemas.microsoft.com/office/drawing/2010/main">
+                <a:solidFill>
+                  <a:srgbClr val="FFFFFF"/>
+                </a:solidFill>
+              </a14:hiddenFill>
+            </a:ext>
+          </a:extLst>
+        </p:spPr>
+      </p:pic>
+    </p:spTree>
+    <p:extLst>
+      <p:ext uri="{BB962C8B-B14F-4D97-AF65-F5344CB8AC3E}">
+        <p14:creationId xmlns:p14="http://schemas.microsoft.com/office/powerpoint/2010/main" val="66836016"/>
       </p:ext>
     </p:extLst>
   </p:cSld>
@@ -26052,6 +28562,777 @@
         </p:txBody>
       </p:sp>
     </p:spTree>
+  </p:cSld>
+  <p:clrMapOvr>
+    <a:masterClrMapping/>
+  </p:clrMapOvr>
+</p:sld>
+</file>
+
+<file path=ppt/slides/slide50.xml><?xml version="1.0" encoding="utf-8"?>
+<p:sld xmlns:a="http://schemas.openxmlformats.org/drawingml/2006/main" xmlns:r="http://schemas.openxmlformats.org/officeDocument/2006/relationships" xmlns:p="http://schemas.openxmlformats.org/presentationml/2006/main">
+  <p:cSld>
+    <p:spTree>
+      <p:nvGrpSpPr>
+        <p:cNvPr id="1" name="Shape 113"/>
+        <p:cNvGrpSpPr/>
+        <p:nvPr/>
+      </p:nvGrpSpPr>
+      <p:grpSpPr>
+        <a:xfrm>
+          <a:off x="0" y="0"/>
+          <a:ext cx="0" cy="0"/>
+          <a:chOff x="0" y="0"/>
+          <a:chExt cx="0" cy="0"/>
+        </a:xfrm>
+      </p:grpSpPr>
+      <p:sp>
+        <p:nvSpPr>
+          <p:cNvPr id="114" name="Shape 114"/>
+          <p:cNvSpPr txBox="1">
+            <a:spLocks noGrp="1"/>
+          </p:cNvSpPr>
+          <p:nvPr>
+            <p:ph type="title"/>
+          </p:nvPr>
+        </p:nvSpPr>
+        <p:spPr>
+          <a:xfrm>
+            <a:off x="76200" y="152400"/>
+            <a:ext cx="8991600" cy="671400"/>
+          </a:xfrm>
+          <a:prstGeom prst="rect">
+            <a:avLst/>
+          </a:prstGeom>
+        </p:spPr>
+        <p:txBody>
+          <a:bodyPr lIns="91425" tIns="91425" rIns="91425" bIns="91425" anchor="ctr" anchorCtr="0">
+            <a:noAutofit/>
+          </a:bodyPr>
+          <a:lstStyle/>
+          <a:p>
+            <a:pPr lvl="0">
+              <a:spcBef>
+                <a:spcPts val="0"/>
+              </a:spcBef>
+              <a:buNone/>
+            </a:pPr>
+            <a:r>
+              <a:rPr lang="en-US" dirty="0"/>
+              <a:t>REVIEW</a:t>
+            </a:r>
+            <a:endParaRPr dirty="0"/>
+          </a:p>
+        </p:txBody>
+      </p:sp>
+      <p:sp>
+        <p:nvSpPr>
+          <p:cNvPr id="115" name="Shape 115"/>
+          <p:cNvSpPr txBox="1">
+            <a:spLocks noGrp="1"/>
+          </p:cNvSpPr>
+          <p:nvPr>
+            <p:ph type="body" idx="1"/>
+          </p:nvPr>
+        </p:nvSpPr>
+        <p:spPr>
+          <a:xfrm>
+            <a:off x="76200" y="1281906"/>
+            <a:ext cx="8991600" cy="4070929"/>
+          </a:xfrm>
+          <a:prstGeom prst="rect">
+            <a:avLst/>
+          </a:prstGeom>
+        </p:spPr>
+        <p:txBody>
+          <a:bodyPr lIns="91425" tIns="91425" rIns="91425" bIns="91425" anchor="t" anchorCtr="0">
+            <a:noAutofit/>
+          </a:bodyPr>
+          <a:lstStyle/>
+          <a:p>
+            <a:pPr>
+              <a:spcBef>
+                <a:spcPts val="0"/>
+              </a:spcBef>
+            </a:pPr>
+            <a:r>
+              <a:rPr lang="en-US" dirty="0">
+                <a:solidFill>
+                  <a:schemeClr val="tx1"/>
+                </a:solidFill>
+                <a:latin typeface="+mn-lt"/>
+              </a:rPr>
+              <a:t> A GO workspace has two main folders:</a:t>
+            </a:r>
+          </a:p>
+          <a:p>
+            <a:pPr lvl="1">
+              <a:spcBef>
+                <a:spcPts val="0"/>
+              </a:spcBef>
+            </a:pPr>
+            <a:r>
+              <a:rPr lang="en-US" dirty="0">
+                <a:solidFill>
+                  <a:schemeClr val="tx1"/>
+                </a:solidFill>
+                <a:latin typeface="+mn-lt"/>
+              </a:rPr>
+              <a:t> </a:t>
+            </a:r>
+            <a:r>
+              <a:rPr lang="en-US" b="1" dirty="0" err="1">
+                <a:solidFill>
+                  <a:schemeClr val="tx1"/>
+                </a:solidFill>
+                <a:latin typeface="+mn-lt"/>
+              </a:rPr>
+              <a:t>src</a:t>
+            </a:r>
+            <a:r>
+              <a:rPr lang="en-US" b="1" dirty="0">
+                <a:solidFill>
+                  <a:schemeClr val="tx1"/>
+                </a:solidFill>
+                <a:latin typeface="+mn-lt"/>
+              </a:rPr>
+              <a:t>/ </a:t>
+            </a:r>
+            <a:r>
+              <a:rPr lang="en-US" dirty="0">
+                <a:solidFill>
+                  <a:schemeClr val="tx1"/>
+                </a:solidFill>
+                <a:latin typeface="+mn-lt"/>
+              </a:rPr>
+              <a:t>- where we keep </a:t>
+            </a:r>
+            <a:r>
+              <a:rPr lang="en-US" b="1" dirty="0">
+                <a:solidFill>
+                  <a:schemeClr val="tx1"/>
+                </a:solidFill>
+                <a:latin typeface="+mn-lt"/>
+              </a:rPr>
+              <a:t>uncompiled</a:t>
+            </a:r>
+            <a:r>
+              <a:rPr lang="en-US" dirty="0">
+                <a:solidFill>
+                  <a:schemeClr val="tx1"/>
+                </a:solidFill>
+                <a:latin typeface="+mn-lt"/>
+              </a:rPr>
+              <a:t> code and </a:t>
+            </a:r>
+          </a:p>
+          <a:p>
+            <a:pPr lvl="1">
+              <a:spcBef>
+                <a:spcPts val="0"/>
+              </a:spcBef>
+            </a:pPr>
+            <a:r>
+              <a:rPr lang="en-US" b="1" dirty="0">
+                <a:solidFill>
+                  <a:schemeClr val="tx1"/>
+                </a:solidFill>
+                <a:latin typeface="+mn-lt"/>
+              </a:rPr>
+              <a:t> bin/</a:t>
+            </a:r>
+            <a:r>
+              <a:rPr lang="en-US" dirty="0">
+                <a:solidFill>
+                  <a:schemeClr val="tx1"/>
+                </a:solidFill>
+                <a:latin typeface="+mn-lt"/>
+              </a:rPr>
+              <a:t> - where we keep our binaries</a:t>
+            </a:r>
+          </a:p>
+          <a:p>
+            <a:pPr>
+              <a:spcBef>
+                <a:spcPts val="0"/>
+              </a:spcBef>
+            </a:pPr>
+            <a:r>
+              <a:rPr lang="en-US" b="1" dirty="0">
+                <a:solidFill>
+                  <a:schemeClr val="tx1"/>
+                </a:solidFill>
+                <a:latin typeface="+mn-lt"/>
+              </a:rPr>
+              <a:t> </a:t>
+            </a:r>
+            <a:r>
+              <a:rPr lang="en-US" dirty="0">
+                <a:solidFill>
+                  <a:schemeClr val="tx1"/>
+                </a:solidFill>
+                <a:latin typeface="+mn-lt"/>
+              </a:rPr>
+              <a:t>We have set up a directory structure under the main workspace that includes things like </a:t>
+            </a:r>
+            <a:r>
+              <a:rPr lang="en-US" b="1" dirty="0">
+                <a:solidFill>
+                  <a:schemeClr val="tx1"/>
+                </a:solidFill>
+                <a:latin typeface="+mn-lt"/>
+              </a:rPr>
+              <a:t>internal, </a:t>
+            </a:r>
+            <a:r>
+              <a:rPr lang="en-US" b="1" dirty="0" err="1">
+                <a:solidFill>
+                  <a:schemeClr val="tx1"/>
+                </a:solidFill>
+                <a:latin typeface="+mn-lt"/>
+              </a:rPr>
+              <a:t>cmd</a:t>
+            </a:r>
+            <a:r>
+              <a:rPr lang="en-US" b="1" dirty="0">
+                <a:solidFill>
+                  <a:schemeClr val="tx1"/>
+                </a:solidFill>
+                <a:latin typeface="+mn-lt"/>
+              </a:rPr>
+              <a:t>, </a:t>
+            </a:r>
+            <a:r>
+              <a:rPr lang="en-US" b="1" dirty="0" err="1">
+                <a:solidFill>
+                  <a:schemeClr val="tx1"/>
+                </a:solidFill>
+                <a:latin typeface="+mn-lt"/>
+              </a:rPr>
+              <a:t>pkg</a:t>
+            </a:r>
+            <a:r>
+              <a:rPr lang="en-US" b="1" dirty="0">
+                <a:solidFill>
+                  <a:schemeClr val="tx1"/>
+                </a:solidFill>
+                <a:latin typeface="+mn-lt"/>
+              </a:rPr>
+              <a:t>, </a:t>
+            </a:r>
+            <a:r>
+              <a:rPr lang="en-US" b="1" dirty="0" err="1">
+                <a:solidFill>
+                  <a:schemeClr val="tx1"/>
+                </a:solidFill>
+                <a:latin typeface="+mn-lt"/>
+              </a:rPr>
+              <a:t>github.com</a:t>
+            </a:r>
+            <a:endParaRPr lang="en-US" dirty="0">
+              <a:solidFill>
+                <a:schemeClr val="tx1"/>
+              </a:solidFill>
+              <a:latin typeface="+mn-lt"/>
+            </a:endParaRPr>
+          </a:p>
+          <a:p>
+            <a:pPr>
+              <a:spcBef>
+                <a:spcPts val="0"/>
+              </a:spcBef>
+            </a:pPr>
+            <a:r>
+              <a:rPr lang="en-US" b="1" dirty="0">
+                <a:solidFill>
+                  <a:schemeClr val="tx1"/>
+                </a:solidFill>
+                <a:latin typeface="+mn-lt"/>
+              </a:rPr>
+              <a:t> </a:t>
+            </a:r>
+            <a:r>
+              <a:rPr lang="en-US" dirty="0">
+                <a:solidFill>
+                  <a:schemeClr val="tx1"/>
+                </a:solidFill>
+                <a:latin typeface="+mn-lt"/>
+              </a:rPr>
+              <a:t>The </a:t>
+            </a:r>
+            <a:r>
+              <a:rPr lang="en-US" b="1" dirty="0">
+                <a:solidFill>
+                  <a:schemeClr val="tx1"/>
+                </a:solidFill>
+                <a:latin typeface="+mn-lt"/>
+              </a:rPr>
+              <a:t>GOPATH </a:t>
+            </a:r>
+            <a:r>
+              <a:rPr lang="en-US" dirty="0">
+                <a:solidFill>
+                  <a:schemeClr val="tx1"/>
+                </a:solidFill>
+                <a:latin typeface="+mn-lt"/>
+              </a:rPr>
+              <a:t>variable will determine where you put packages from </a:t>
+            </a:r>
+            <a:r>
+              <a:rPr lang="en-US" b="1" dirty="0">
+                <a:solidFill>
+                  <a:schemeClr val="tx1"/>
+                </a:solidFill>
+                <a:latin typeface="+mn-lt"/>
+              </a:rPr>
+              <a:t>go get</a:t>
+            </a:r>
+          </a:p>
+          <a:p>
+            <a:pPr lvl="1">
+              <a:spcBef>
+                <a:spcPts val="0"/>
+              </a:spcBef>
+            </a:pPr>
+            <a:endParaRPr lang="en-US" dirty="0">
+              <a:solidFill>
+                <a:schemeClr val="tx1"/>
+              </a:solidFill>
+              <a:latin typeface="+mn-lt"/>
+            </a:endParaRPr>
+          </a:p>
+          <a:p>
+            <a:pPr lvl="2">
+              <a:spcBef>
+                <a:spcPts val="0"/>
+              </a:spcBef>
+            </a:pPr>
+            <a:endParaRPr lang="en-US" dirty="0">
+              <a:solidFill>
+                <a:schemeClr val="tx1"/>
+              </a:solidFill>
+            </a:endParaRPr>
+          </a:p>
+          <a:p>
+            <a:pPr lvl="3">
+              <a:spcBef>
+                <a:spcPts val="0"/>
+              </a:spcBef>
+            </a:pPr>
+            <a:endParaRPr lang="en-US" dirty="0">
+              <a:solidFill>
+                <a:schemeClr val="tx1"/>
+              </a:solidFill>
+              <a:latin typeface="+mn-lt"/>
+            </a:endParaRPr>
+          </a:p>
+          <a:p>
+            <a:pPr lvl="3">
+              <a:spcBef>
+                <a:spcPts val="0"/>
+              </a:spcBef>
+            </a:pPr>
+            <a:endParaRPr lang="en-US" dirty="0">
+              <a:solidFill>
+                <a:schemeClr val="tx1"/>
+              </a:solidFill>
+              <a:latin typeface="+mn-lt"/>
+            </a:endParaRPr>
+          </a:p>
+          <a:p>
+            <a:pPr lvl="3">
+              <a:spcBef>
+                <a:spcPts val="0"/>
+              </a:spcBef>
+            </a:pPr>
+            <a:endParaRPr lang="en-US" dirty="0">
+              <a:solidFill>
+                <a:schemeClr val="tx1"/>
+              </a:solidFill>
+              <a:latin typeface="+mn-lt"/>
+            </a:endParaRPr>
+          </a:p>
+          <a:p>
+            <a:pPr lvl="3">
+              <a:spcBef>
+                <a:spcPts val="0"/>
+              </a:spcBef>
+            </a:pPr>
+            <a:endParaRPr lang="en-US" dirty="0">
+              <a:solidFill>
+                <a:schemeClr val="tx1"/>
+              </a:solidFill>
+              <a:latin typeface="+mn-lt"/>
+            </a:endParaRPr>
+          </a:p>
+          <a:p>
+            <a:pPr lvl="3">
+              <a:spcBef>
+                <a:spcPts val="0"/>
+              </a:spcBef>
+            </a:pPr>
+            <a:endParaRPr lang="en-US" dirty="0">
+              <a:solidFill>
+                <a:schemeClr val="tx1"/>
+              </a:solidFill>
+              <a:latin typeface="+mn-lt"/>
+            </a:endParaRPr>
+          </a:p>
+        </p:txBody>
+      </p:sp>
+      <p:pic>
+        <p:nvPicPr>
+          <p:cNvPr id="2050" name="Picture 2" descr="Image result for golang gopher image">
+            <a:extLst>
+              <a:ext uri="{FF2B5EF4-FFF2-40B4-BE49-F238E27FC236}">
+                <a16:creationId xmlns:a16="http://schemas.microsoft.com/office/drawing/2014/main" id="{F7B1219D-D540-764B-A16A-A2972E612FEE}"/>
+              </a:ext>
+            </a:extLst>
+          </p:cNvPr>
+          <p:cNvPicPr>
+            <a:picLocks noChangeAspect="1" noChangeArrowheads="1"/>
+          </p:cNvPicPr>
+          <p:nvPr/>
+        </p:nvPicPr>
+        <p:blipFill>
+          <a:blip r:embed="rId3">
+            <a:extLst>
+              <a:ext uri="{28A0092B-C50C-407E-A947-70E740481C1C}">
+                <a14:useLocalDpi xmlns:a14="http://schemas.microsoft.com/office/drawing/2010/main" val="0"/>
+              </a:ext>
+            </a:extLst>
+          </a:blip>
+          <a:srcRect/>
+          <a:stretch>
+            <a:fillRect/>
+          </a:stretch>
+        </p:blipFill>
+        <p:spPr bwMode="auto">
+          <a:xfrm>
+            <a:off x="5013788" y="4306729"/>
+            <a:ext cx="2695111" cy="2225922"/>
+          </a:xfrm>
+          <a:prstGeom prst="rect">
+            <a:avLst/>
+          </a:prstGeom>
+          <a:noFill/>
+          <a:extLst>
+            <a:ext uri="{909E8E84-426E-40DD-AFC4-6F175D3DCCD1}">
+              <a14:hiddenFill xmlns:a14="http://schemas.microsoft.com/office/drawing/2010/main">
+                <a:solidFill>
+                  <a:srgbClr val="FFFFFF"/>
+                </a:solidFill>
+              </a14:hiddenFill>
+            </a:ext>
+          </a:extLst>
+        </p:spPr>
+      </p:pic>
+    </p:spTree>
+    <p:extLst>
+      <p:ext uri="{BB962C8B-B14F-4D97-AF65-F5344CB8AC3E}">
+        <p14:creationId xmlns:p14="http://schemas.microsoft.com/office/powerpoint/2010/main" val="242680074"/>
+      </p:ext>
+    </p:extLst>
+  </p:cSld>
+  <p:clrMapOvr>
+    <a:masterClrMapping/>
+  </p:clrMapOvr>
+</p:sld>
+</file>
+
+<file path=ppt/slides/slide51.xml><?xml version="1.0" encoding="utf-8"?>
+<p:sld xmlns:a="http://schemas.openxmlformats.org/drawingml/2006/main" xmlns:r="http://schemas.openxmlformats.org/officeDocument/2006/relationships" xmlns:p="http://schemas.openxmlformats.org/presentationml/2006/main">
+  <p:cSld>
+    <p:spTree>
+      <p:nvGrpSpPr>
+        <p:cNvPr id="1" name="Shape 113"/>
+        <p:cNvGrpSpPr/>
+        <p:nvPr/>
+      </p:nvGrpSpPr>
+      <p:grpSpPr>
+        <a:xfrm>
+          <a:off x="0" y="0"/>
+          <a:ext cx="0" cy="0"/>
+          <a:chOff x="0" y="0"/>
+          <a:chExt cx="0" cy="0"/>
+        </a:xfrm>
+      </p:grpSpPr>
+      <p:sp>
+        <p:nvSpPr>
+          <p:cNvPr id="114" name="Shape 114"/>
+          <p:cNvSpPr txBox="1">
+            <a:spLocks noGrp="1"/>
+          </p:cNvSpPr>
+          <p:nvPr>
+            <p:ph type="title"/>
+          </p:nvPr>
+        </p:nvSpPr>
+        <p:spPr>
+          <a:xfrm>
+            <a:off x="76200" y="152400"/>
+            <a:ext cx="8991600" cy="671400"/>
+          </a:xfrm>
+          <a:prstGeom prst="rect">
+            <a:avLst/>
+          </a:prstGeom>
+        </p:spPr>
+        <p:txBody>
+          <a:bodyPr lIns="91425" tIns="91425" rIns="91425" bIns="91425" anchor="ctr" anchorCtr="0">
+            <a:noAutofit/>
+          </a:bodyPr>
+          <a:lstStyle/>
+          <a:p>
+            <a:pPr lvl="0">
+              <a:spcBef>
+                <a:spcPts val="0"/>
+              </a:spcBef>
+              <a:buNone/>
+            </a:pPr>
+            <a:r>
+              <a:rPr lang="en-US" dirty="0"/>
+              <a:t>QUIZ</a:t>
+            </a:r>
+            <a:endParaRPr dirty="0"/>
+          </a:p>
+        </p:txBody>
+      </p:sp>
+      <p:sp>
+        <p:nvSpPr>
+          <p:cNvPr id="115" name="Shape 115"/>
+          <p:cNvSpPr txBox="1">
+            <a:spLocks noGrp="1"/>
+          </p:cNvSpPr>
+          <p:nvPr>
+            <p:ph type="body" idx="1"/>
+          </p:nvPr>
+        </p:nvSpPr>
+        <p:spPr>
+          <a:xfrm>
+            <a:off x="76200" y="1312729"/>
+            <a:ext cx="8991600" cy="4070929"/>
+          </a:xfrm>
+          <a:prstGeom prst="rect">
+            <a:avLst/>
+          </a:prstGeom>
+        </p:spPr>
+        <p:txBody>
+          <a:bodyPr lIns="91425" tIns="91425" rIns="91425" bIns="91425" anchor="t" anchorCtr="0">
+            <a:noAutofit/>
+          </a:bodyPr>
+          <a:lstStyle/>
+          <a:p>
+            <a:pPr>
+              <a:spcBef>
+                <a:spcPts val="0"/>
+              </a:spcBef>
+            </a:pPr>
+            <a:r>
+              <a:rPr lang="en-US" dirty="0">
+                <a:solidFill>
+                  <a:schemeClr val="tx1"/>
+                </a:solidFill>
+                <a:latin typeface="+mn-lt"/>
+              </a:rPr>
+              <a:t> Where should I put the </a:t>
+            </a:r>
+            <a:r>
+              <a:rPr lang="en-US" b="1" dirty="0" err="1">
+                <a:solidFill>
+                  <a:schemeClr val="tx1"/>
+                </a:solidFill>
+                <a:latin typeface="+mn-lt"/>
+              </a:rPr>
+              <a:t>main.go</a:t>
+            </a:r>
+            <a:r>
+              <a:rPr lang="en-US" dirty="0">
+                <a:solidFill>
+                  <a:schemeClr val="tx1"/>
+                </a:solidFill>
+                <a:latin typeface="+mn-lt"/>
+              </a:rPr>
+              <a:t> package? </a:t>
+            </a:r>
+          </a:p>
+          <a:p>
+            <a:pPr>
+              <a:spcBef>
+                <a:spcPts val="0"/>
+              </a:spcBef>
+            </a:pPr>
+            <a:r>
+              <a:rPr lang="en-US" dirty="0">
+                <a:solidFill>
+                  <a:schemeClr val="tx1"/>
+                </a:solidFill>
+                <a:latin typeface="+mn-lt"/>
+              </a:rPr>
+              <a:t> How do I set up a new package within my workspace with git? </a:t>
+            </a:r>
+          </a:p>
+          <a:p>
+            <a:pPr>
+              <a:spcBef>
+                <a:spcPts val="0"/>
+              </a:spcBef>
+            </a:pPr>
+            <a:r>
+              <a:rPr lang="en-US" dirty="0">
+                <a:solidFill>
+                  <a:schemeClr val="tx1"/>
+                </a:solidFill>
+                <a:latin typeface="+mn-lt"/>
+              </a:rPr>
+              <a:t> How can I manipulate where my </a:t>
+            </a:r>
+            <a:r>
+              <a:rPr lang="en-US" b="1" dirty="0">
+                <a:solidFill>
+                  <a:schemeClr val="tx1"/>
+                </a:solidFill>
+                <a:latin typeface="+mn-lt"/>
+              </a:rPr>
+              <a:t>go get</a:t>
+            </a:r>
+            <a:r>
+              <a:rPr lang="en-US" dirty="0">
+                <a:solidFill>
+                  <a:schemeClr val="tx1"/>
+                </a:solidFill>
+                <a:latin typeface="+mn-lt"/>
+              </a:rPr>
+              <a:t> command line sends my packages? </a:t>
+            </a:r>
+          </a:p>
+          <a:p>
+            <a:pPr>
+              <a:spcBef>
+                <a:spcPts val="0"/>
+              </a:spcBef>
+            </a:pPr>
+            <a:r>
+              <a:rPr lang="en-US" dirty="0">
+                <a:solidFill>
+                  <a:schemeClr val="tx1"/>
+                </a:solidFill>
+                <a:latin typeface="+mn-lt"/>
+              </a:rPr>
+              <a:t> How do I run basic code? </a:t>
+            </a:r>
+          </a:p>
+          <a:p>
+            <a:pPr>
+              <a:spcBef>
+                <a:spcPts val="0"/>
+              </a:spcBef>
+            </a:pPr>
+            <a:r>
+              <a:rPr lang="en-US" dirty="0">
+                <a:solidFill>
+                  <a:schemeClr val="tx1"/>
+                </a:solidFill>
+                <a:latin typeface="+mn-lt"/>
+              </a:rPr>
+              <a:t> How do I build a binary?</a:t>
+            </a:r>
+          </a:p>
+          <a:p>
+            <a:pPr marL="1485900" lvl="3" indent="0">
+              <a:spcBef>
+                <a:spcPts val="0"/>
+              </a:spcBef>
+              <a:buNone/>
+            </a:pPr>
+            <a:endParaRPr lang="en-US" dirty="0">
+              <a:solidFill>
+                <a:schemeClr val="tx1"/>
+              </a:solidFill>
+              <a:latin typeface="+mn-lt"/>
+            </a:endParaRPr>
+          </a:p>
+          <a:p>
+            <a:pPr marL="1485900" lvl="3" indent="0">
+              <a:spcBef>
+                <a:spcPts val="0"/>
+              </a:spcBef>
+              <a:buNone/>
+            </a:pPr>
+            <a:endParaRPr lang="en-US" dirty="0">
+              <a:solidFill>
+                <a:schemeClr val="tx1"/>
+              </a:solidFill>
+              <a:latin typeface="+mn-lt"/>
+            </a:endParaRPr>
+          </a:p>
+          <a:p>
+            <a:pPr marL="1485900" lvl="3" indent="0">
+              <a:spcBef>
+                <a:spcPts val="0"/>
+              </a:spcBef>
+              <a:buNone/>
+            </a:pPr>
+            <a:endParaRPr lang="en-US" dirty="0">
+              <a:solidFill>
+                <a:schemeClr val="tx1"/>
+              </a:solidFill>
+              <a:latin typeface="+mn-lt"/>
+            </a:endParaRPr>
+          </a:p>
+        </p:txBody>
+      </p:sp>
+      <p:pic>
+        <p:nvPicPr>
+          <p:cNvPr id="3074" name="Picture 2" descr="Image result for golang gopher image">
+            <a:extLst>
+              <a:ext uri="{FF2B5EF4-FFF2-40B4-BE49-F238E27FC236}">
+                <a16:creationId xmlns:a16="http://schemas.microsoft.com/office/drawing/2014/main" id="{DCB5CA80-FE1F-8F44-8B56-04CDCAA19647}"/>
+              </a:ext>
+            </a:extLst>
+          </p:cNvPr>
+          <p:cNvPicPr>
+            <a:picLocks noChangeAspect="1" noChangeArrowheads="1"/>
+          </p:cNvPicPr>
+          <p:nvPr/>
+        </p:nvPicPr>
+        <p:blipFill>
+          <a:blip r:embed="rId3">
+            <a:extLst>
+              <a:ext uri="{28A0092B-C50C-407E-A947-70E740481C1C}">
+                <a14:useLocalDpi xmlns:a14="http://schemas.microsoft.com/office/drawing/2010/main" val="0"/>
+              </a:ext>
+            </a:extLst>
+          </a:blip>
+          <a:srcRect/>
+          <a:stretch>
+            <a:fillRect/>
+          </a:stretch>
+        </p:blipFill>
+        <p:spPr bwMode="auto">
+          <a:xfrm>
+            <a:off x="5149351" y="3758415"/>
+            <a:ext cx="3098800" cy="2628900"/>
+          </a:xfrm>
+          <a:prstGeom prst="rect">
+            <a:avLst/>
+          </a:prstGeom>
+          <a:noFill/>
+          <a:extLst>
+            <a:ext uri="{909E8E84-426E-40DD-AFC4-6F175D3DCCD1}">
+              <a14:hiddenFill xmlns:a14="http://schemas.microsoft.com/office/drawing/2010/main">
+                <a:solidFill>
+                  <a:srgbClr val="FFFFFF"/>
+                </a:solidFill>
+              </a14:hiddenFill>
+            </a:ext>
+          </a:extLst>
+        </p:spPr>
+      </p:pic>
+    </p:spTree>
+    <p:extLst>
+      <p:ext uri="{BB962C8B-B14F-4D97-AF65-F5344CB8AC3E}">
+        <p14:creationId xmlns:p14="http://schemas.microsoft.com/office/powerpoint/2010/main" val="2560586821"/>
+      </p:ext>
+    </p:extLst>
   </p:cSld>
   <p:clrMapOvr>
     <a:masterClrMapping/>

</xml_diff>